<commit_message>
Change convolution to unicode font symbol
</commit_message>
<xml_diff>
--- a/Figs/Vector/groupfig.pptx
+++ b/Figs/Vector/groupfig.pptx
@@ -208,10 +208,6 @@
     </p:ext>
   </p:extLst>
 </p:presentation>
-</file>
-
-<file path=ppt/revisionInfo.xml><?xml version="1.0" encoding="utf-8"?>
-<p1510:revInfo xmlns:a="http://schemas.openxmlformats.org/drawingml/2006/main" xmlns:r="http://schemas.openxmlformats.org/officeDocument/2006/relationships" xmlns:p1510="http://schemas.microsoft.com/office/powerpoint/2015/10/main"/>
 </file>
 
 <file path=ppt/notesMasters/notesMaster1.xml><?xml version="1.0" encoding="utf-8"?>
@@ -3522,40 +3518,6 @@
           </a:p>
         </p:txBody>
       </p:sp>
-      <p:pic>
-        <p:nvPicPr>
-          <p:cNvPr id="26" name="Picture 25"/>
-          <p:cNvPicPr>
-            <a:picLocks noChangeAspect="1"/>
-          </p:cNvPicPr>
-          <p:nvPr>
-            <p:custDataLst>
-              <p:tags r:id="rId1"/>
-            </p:custDataLst>
-          </p:nvPr>
-        </p:nvPicPr>
-        <p:blipFill>
-          <a:blip r:embed="rId3" cstate="print">
-            <a:extLst>
-              <a:ext uri="{28A0092B-C50C-407E-A947-70E740481C1C}">
-                <a14:useLocalDpi xmlns:a14="http://schemas.microsoft.com/office/drawing/2010/main" val="0"/>
-              </a:ext>
-            </a:extLst>
-          </a:blip>
-          <a:stretch>
-            <a:fillRect/>
-          </a:stretch>
-        </p:blipFill>
-        <p:spPr>
-          <a:xfrm>
-            <a:off x="3954308" y="3132391"/>
-            <a:ext cx="114300" cy="132588"/>
-          </a:xfrm>
-          <a:prstGeom prst="rect">
-            <a:avLst/>
-          </a:prstGeom>
-        </p:spPr>
-      </p:pic>
       <p:sp>
         <p:nvSpPr>
           <p:cNvPr id="27" name="TextBox 26"/>
@@ -4368,6 +4330,42 @@
           </a:p>
         </p:txBody>
       </p:sp>
+      <p:sp>
+        <p:nvSpPr>
+          <p:cNvPr id="43" name="TextBox 42">
+            <a:extLst>
+              <a:ext uri="{FF2B5EF4-FFF2-40B4-BE49-F238E27FC236}">
+                <a16:creationId xmlns:a16="http://schemas.microsoft.com/office/drawing/2014/main" id="{78974D81-4C10-47EF-8E11-45ECD5AA92F7}"/>
+              </a:ext>
+            </a:extLst>
+          </p:cNvPr>
+          <p:cNvSpPr txBox="1"/>
+          <p:nvPr/>
+        </p:nvSpPr>
+        <p:spPr>
+          <a:xfrm>
+            <a:off x="3836586" y="2920336"/>
+            <a:ext cx="357790" cy="523220"/>
+          </a:xfrm>
+          <a:prstGeom prst="rect">
+            <a:avLst/>
+          </a:prstGeom>
+          <a:noFill/>
+        </p:spPr>
+        <p:txBody>
+          <a:bodyPr wrap="none" rtlCol="0">
+            <a:spAutoFit/>
+          </a:bodyPr>
+          <a:lstStyle/>
+          <a:p>
+            <a:r>
+              <a:rPr lang="en-US" sz="2800" dirty="0"/>
+              <a:t>∗</a:t>
+            </a:r>
+            <a:endParaRPr lang="en" sz="2800" dirty="0"/>
+          </a:p>
+        </p:txBody>
+      </p:sp>
     </p:spTree>
     <p:extLst>
       <p:ext uri="{BB962C8B-B14F-4D97-AF65-F5344CB8AC3E}">
@@ -4472,40 +4470,6 @@
           </a:p>
         </p:txBody>
       </p:sp>
-      <p:pic>
-        <p:nvPicPr>
-          <p:cNvPr id="98" name="Picture 97"/>
-          <p:cNvPicPr>
-            <a:picLocks noChangeAspect="1"/>
-          </p:cNvPicPr>
-          <p:nvPr>
-            <p:custDataLst>
-              <p:tags r:id="rId1"/>
-            </p:custDataLst>
-          </p:nvPr>
-        </p:nvPicPr>
-        <p:blipFill>
-          <a:blip r:embed="rId4" cstate="print">
-            <a:extLst>
-              <a:ext uri="{28A0092B-C50C-407E-A947-70E740481C1C}">
-                <a14:useLocalDpi xmlns:a14="http://schemas.microsoft.com/office/drawing/2010/main" val="0"/>
-              </a:ext>
-            </a:extLst>
-          </a:blip>
-          <a:stretch>
-            <a:fillRect/>
-          </a:stretch>
-        </p:blipFill>
-        <p:spPr>
-          <a:xfrm>
-            <a:off x="7970944" y="3272928"/>
-            <a:ext cx="114300" cy="132588"/>
-          </a:xfrm>
-          <a:prstGeom prst="rect">
-            <a:avLst/>
-          </a:prstGeom>
-        </p:spPr>
-      </p:pic>
       <p:sp>
         <p:nvSpPr>
           <p:cNvPr id="100" name="Cube 99"/>
@@ -4773,40 +4737,6 @@
           </a:p>
         </p:txBody>
       </p:sp>
-      <p:pic>
-        <p:nvPicPr>
-          <p:cNvPr id="133" name="Picture 132"/>
-          <p:cNvPicPr>
-            <a:picLocks noChangeAspect="1"/>
-          </p:cNvPicPr>
-          <p:nvPr>
-            <p:custDataLst>
-              <p:tags r:id="rId2"/>
-            </p:custDataLst>
-          </p:nvPr>
-        </p:nvPicPr>
-        <p:blipFill>
-          <a:blip r:embed="rId4" cstate="print">
-            <a:extLst>
-              <a:ext uri="{28A0092B-C50C-407E-A947-70E740481C1C}">
-                <a14:useLocalDpi xmlns:a14="http://schemas.microsoft.com/office/drawing/2010/main" val="0"/>
-              </a:ext>
-            </a:extLst>
-          </a:blip>
-          <a:stretch>
-            <a:fillRect/>
-          </a:stretch>
-        </p:blipFill>
-        <p:spPr>
-          <a:xfrm>
-            <a:off x="3954308" y="3132391"/>
-            <a:ext cx="114300" cy="132588"/>
-          </a:xfrm>
-          <a:prstGeom prst="rect">
-            <a:avLst/>
-          </a:prstGeom>
-        </p:spPr>
-      </p:pic>
       <p:sp>
         <p:nvSpPr>
           <p:cNvPr id="157" name="Cube 156"/>
@@ -5559,6 +5489,78 @@
           </a:p>
         </p:txBody>
       </p:sp>
+      <p:sp>
+        <p:nvSpPr>
+          <p:cNvPr id="22" name="TextBox 21">
+            <a:extLst>
+              <a:ext uri="{FF2B5EF4-FFF2-40B4-BE49-F238E27FC236}">
+                <a16:creationId xmlns:a16="http://schemas.microsoft.com/office/drawing/2014/main" id="{B8D59B8A-2625-425B-B5C4-AF180142072E}"/>
+              </a:ext>
+            </a:extLst>
+          </p:cNvPr>
+          <p:cNvSpPr txBox="1"/>
+          <p:nvPr/>
+        </p:nvSpPr>
+        <p:spPr>
+          <a:xfrm>
+            <a:off x="7852741" y="3061449"/>
+            <a:ext cx="357790" cy="523220"/>
+          </a:xfrm>
+          <a:prstGeom prst="rect">
+            <a:avLst/>
+          </a:prstGeom>
+          <a:noFill/>
+        </p:spPr>
+        <p:txBody>
+          <a:bodyPr wrap="none" rtlCol="0">
+            <a:spAutoFit/>
+          </a:bodyPr>
+          <a:lstStyle/>
+          <a:p>
+            <a:r>
+              <a:rPr lang="en-US" sz="2800" dirty="0"/>
+              <a:t>∗</a:t>
+            </a:r>
+            <a:endParaRPr lang="en" sz="2800" dirty="0"/>
+          </a:p>
+        </p:txBody>
+      </p:sp>
+      <p:sp>
+        <p:nvSpPr>
+          <p:cNvPr id="23" name="TextBox 22">
+            <a:extLst>
+              <a:ext uri="{FF2B5EF4-FFF2-40B4-BE49-F238E27FC236}">
+                <a16:creationId xmlns:a16="http://schemas.microsoft.com/office/drawing/2014/main" id="{29F5A8CD-6A41-4DF7-AA8D-7083A80DB7C9}"/>
+              </a:ext>
+            </a:extLst>
+          </p:cNvPr>
+          <p:cNvSpPr txBox="1"/>
+          <p:nvPr/>
+        </p:nvSpPr>
+        <p:spPr>
+          <a:xfrm>
+            <a:off x="3836554" y="2918022"/>
+            <a:ext cx="357790" cy="523220"/>
+          </a:xfrm>
+          <a:prstGeom prst="rect">
+            <a:avLst/>
+          </a:prstGeom>
+          <a:noFill/>
+        </p:spPr>
+        <p:txBody>
+          <a:bodyPr wrap="none" rtlCol="0">
+            <a:spAutoFit/>
+          </a:bodyPr>
+          <a:lstStyle/>
+          <a:p>
+            <a:r>
+              <a:rPr lang="en-US" sz="2800" dirty="0"/>
+              <a:t>∗</a:t>
+            </a:r>
+            <a:endParaRPr lang="en" sz="2800" dirty="0"/>
+          </a:p>
+        </p:txBody>
+      </p:sp>
     </p:spTree>
     <p:extLst>
       <p:ext uri="{BB962C8B-B14F-4D97-AF65-F5344CB8AC3E}">
@@ -5599,6 +5601,78 @@
       </p:grpSpPr>
       <p:sp>
         <p:nvSpPr>
+          <p:cNvPr id="28" name="TextBox 27">
+            <a:extLst>
+              <a:ext uri="{FF2B5EF4-FFF2-40B4-BE49-F238E27FC236}">
+                <a16:creationId xmlns:a16="http://schemas.microsoft.com/office/drawing/2014/main" id="{066FF9CA-733D-43E1-93BF-F06F2C69CD0D}"/>
+              </a:ext>
+            </a:extLst>
+          </p:cNvPr>
+          <p:cNvSpPr txBox="1"/>
+          <p:nvPr/>
+        </p:nvSpPr>
+        <p:spPr>
+          <a:xfrm>
+            <a:off x="7852741" y="3061449"/>
+            <a:ext cx="357790" cy="523220"/>
+          </a:xfrm>
+          <a:prstGeom prst="rect">
+            <a:avLst/>
+          </a:prstGeom>
+          <a:noFill/>
+        </p:spPr>
+        <p:txBody>
+          <a:bodyPr wrap="none" rtlCol="0">
+            <a:spAutoFit/>
+          </a:bodyPr>
+          <a:lstStyle/>
+          <a:p>
+            <a:r>
+              <a:rPr lang="en-US" sz="2800" dirty="0"/>
+              <a:t>∗</a:t>
+            </a:r>
+            <a:endParaRPr lang="en" sz="2800" dirty="0"/>
+          </a:p>
+        </p:txBody>
+      </p:sp>
+      <p:sp>
+        <p:nvSpPr>
+          <p:cNvPr id="27" name="TextBox 26">
+            <a:extLst>
+              <a:ext uri="{FF2B5EF4-FFF2-40B4-BE49-F238E27FC236}">
+                <a16:creationId xmlns:a16="http://schemas.microsoft.com/office/drawing/2014/main" id="{0AF2F9A6-4F50-4526-8336-F10505FC9B5F}"/>
+              </a:ext>
+            </a:extLst>
+          </p:cNvPr>
+          <p:cNvSpPr txBox="1"/>
+          <p:nvPr/>
+        </p:nvSpPr>
+        <p:spPr>
+          <a:xfrm>
+            <a:off x="3836554" y="2918022"/>
+            <a:ext cx="357790" cy="523220"/>
+          </a:xfrm>
+          <a:prstGeom prst="rect">
+            <a:avLst/>
+          </a:prstGeom>
+          <a:noFill/>
+        </p:spPr>
+        <p:txBody>
+          <a:bodyPr wrap="none" rtlCol="0">
+            <a:spAutoFit/>
+          </a:bodyPr>
+          <a:lstStyle/>
+          <a:p>
+            <a:r>
+              <a:rPr lang="en-US" sz="2800" dirty="0"/>
+              <a:t>∗</a:t>
+            </a:r>
+            <a:endParaRPr lang="en" sz="2800" dirty="0"/>
+          </a:p>
+        </p:txBody>
+      </p:sp>
+      <p:sp>
+        <p:nvSpPr>
           <p:cNvPr id="44" name="Cube 43"/>
           <p:cNvSpPr/>
           <p:nvPr/>
@@ -5803,40 +5877,6 @@
           </a:p>
         </p:txBody>
       </p:sp>
-      <p:pic>
-        <p:nvPicPr>
-          <p:cNvPr id="98" name="Picture 97"/>
-          <p:cNvPicPr>
-            <a:picLocks noChangeAspect="1"/>
-          </p:cNvPicPr>
-          <p:nvPr>
-            <p:custDataLst>
-              <p:tags r:id="rId1"/>
-            </p:custDataLst>
-          </p:nvPr>
-        </p:nvPicPr>
-        <p:blipFill>
-          <a:blip r:embed="rId4" cstate="print">
-            <a:extLst>
-              <a:ext uri="{28A0092B-C50C-407E-A947-70E740481C1C}">
-                <a14:useLocalDpi xmlns:a14="http://schemas.microsoft.com/office/drawing/2010/main" val="0"/>
-              </a:ext>
-            </a:extLst>
-          </a:blip>
-          <a:stretch>
-            <a:fillRect/>
-          </a:stretch>
-        </p:blipFill>
-        <p:spPr>
-          <a:xfrm>
-            <a:off x="7970944" y="3272928"/>
-            <a:ext cx="114300" cy="132588"/>
-          </a:xfrm>
-          <a:prstGeom prst="rect">
-            <a:avLst/>
-          </a:prstGeom>
-        </p:spPr>
-      </p:pic>
       <p:sp>
         <p:nvSpPr>
           <p:cNvPr id="100" name="Cube 99"/>
@@ -6031,40 +6071,6 @@
           </a:p>
         </p:txBody>
       </p:sp>
-      <p:pic>
-        <p:nvPicPr>
-          <p:cNvPr id="133" name="Picture 132"/>
-          <p:cNvPicPr>
-            <a:picLocks noChangeAspect="1"/>
-          </p:cNvPicPr>
-          <p:nvPr>
-            <p:custDataLst>
-              <p:tags r:id="rId2"/>
-            </p:custDataLst>
-          </p:nvPr>
-        </p:nvPicPr>
-        <p:blipFill>
-          <a:blip r:embed="rId4" cstate="print">
-            <a:extLst>
-              <a:ext uri="{28A0092B-C50C-407E-A947-70E740481C1C}">
-                <a14:useLocalDpi xmlns:a14="http://schemas.microsoft.com/office/drawing/2010/main" val="0"/>
-              </a:ext>
-            </a:extLst>
-          </a:blip>
-          <a:stretch>
-            <a:fillRect/>
-          </a:stretch>
-        </p:blipFill>
-        <p:spPr>
-          <a:xfrm>
-            <a:off x="3954308" y="3132391"/>
-            <a:ext cx="114300" cy="132588"/>
-          </a:xfrm>
-          <a:prstGeom prst="rect">
-            <a:avLst/>
-          </a:prstGeom>
-        </p:spPr>
-      </p:pic>
       <p:sp>
         <p:nvSpPr>
           <p:cNvPr id="129" name="Cube 128"/>
@@ -6660,40 +6666,78 @@
           <a:chExt cx="0" cy="0"/>
         </a:xfrm>
       </p:grpSpPr>
-      <p:pic>
-        <p:nvPicPr>
-          <p:cNvPr id="98" name="Picture 97"/>
-          <p:cNvPicPr>
-            <a:picLocks noChangeAspect="1"/>
-          </p:cNvPicPr>
-          <p:nvPr>
-            <p:custDataLst>
-              <p:tags r:id="rId1"/>
-            </p:custDataLst>
-          </p:nvPr>
-        </p:nvPicPr>
-        <p:blipFill>
-          <a:blip r:embed="rId4" cstate="print">
+      <p:sp>
+        <p:nvSpPr>
+          <p:cNvPr id="42" name="TextBox 41">
             <a:extLst>
-              <a:ext uri="{28A0092B-C50C-407E-A947-70E740481C1C}">
-                <a14:useLocalDpi xmlns:a14="http://schemas.microsoft.com/office/drawing/2010/main" val="0"/>
+              <a:ext uri="{FF2B5EF4-FFF2-40B4-BE49-F238E27FC236}">
+                <a16:creationId xmlns:a16="http://schemas.microsoft.com/office/drawing/2014/main" id="{0A894F91-8CDF-4F2E-89FD-CF683B8A52D7}"/>
               </a:ext>
             </a:extLst>
-          </a:blip>
-          <a:stretch>
-            <a:fillRect/>
-          </a:stretch>
-        </p:blipFill>
-        <p:spPr>
-          <a:xfrm>
-            <a:off x="7970944" y="3272928"/>
-            <a:ext cx="114300" cy="132588"/>
+          </p:cNvPr>
+          <p:cNvSpPr txBox="1"/>
+          <p:nvPr/>
+        </p:nvSpPr>
+        <p:spPr>
+          <a:xfrm>
+            <a:off x="7853534" y="3062125"/>
+            <a:ext cx="357790" cy="523220"/>
           </a:xfrm>
           <a:prstGeom prst="rect">
             <a:avLst/>
           </a:prstGeom>
-        </p:spPr>
-      </p:pic>
+          <a:noFill/>
+        </p:spPr>
+        <p:txBody>
+          <a:bodyPr wrap="none" rtlCol="0">
+            <a:spAutoFit/>
+          </a:bodyPr>
+          <a:lstStyle/>
+          <a:p>
+            <a:r>
+              <a:rPr lang="en-US" sz="2800" dirty="0"/>
+              <a:t>∗</a:t>
+            </a:r>
+            <a:endParaRPr lang="en" sz="2800" dirty="0"/>
+          </a:p>
+        </p:txBody>
+      </p:sp>
+      <p:sp>
+        <p:nvSpPr>
+          <p:cNvPr id="41" name="TextBox 40">
+            <a:extLst>
+              <a:ext uri="{FF2B5EF4-FFF2-40B4-BE49-F238E27FC236}">
+                <a16:creationId xmlns:a16="http://schemas.microsoft.com/office/drawing/2014/main" id="{CAADFE14-7A85-44C3-B610-03A8D47CD951}"/>
+              </a:ext>
+            </a:extLst>
+          </p:cNvPr>
+          <p:cNvSpPr txBox="1"/>
+          <p:nvPr/>
+        </p:nvSpPr>
+        <p:spPr>
+          <a:xfrm>
+            <a:off x="3842530" y="2918021"/>
+            <a:ext cx="357790" cy="523220"/>
+          </a:xfrm>
+          <a:prstGeom prst="rect">
+            <a:avLst/>
+          </a:prstGeom>
+          <a:noFill/>
+        </p:spPr>
+        <p:txBody>
+          <a:bodyPr wrap="none" rtlCol="0">
+            <a:spAutoFit/>
+          </a:bodyPr>
+          <a:lstStyle/>
+          <a:p>
+            <a:r>
+              <a:rPr lang="en-US" sz="2800" dirty="0"/>
+              <a:t>∗</a:t>
+            </a:r>
+            <a:endParaRPr lang="en" sz="2800" dirty="0"/>
+          </a:p>
+        </p:txBody>
+      </p:sp>
       <p:sp>
         <p:nvSpPr>
           <p:cNvPr id="100" name="Cube 99"/>
@@ -7567,40 +7611,6 @@
           </a:p>
         </p:txBody>
       </p:sp>
-      <p:pic>
-        <p:nvPicPr>
-          <p:cNvPr id="74" name="Picture 73"/>
-          <p:cNvPicPr>
-            <a:picLocks noChangeAspect="1"/>
-          </p:cNvPicPr>
-          <p:nvPr>
-            <p:custDataLst>
-              <p:tags r:id="rId2"/>
-            </p:custDataLst>
-          </p:nvPr>
-        </p:nvPicPr>
-        <p:blipFill>
-          <a:blip r:embed="rId4" cstate="print">
-            <a:extLst>
-              <a:ext uri="{28A0092B-C50C-407E-A947-70E740481C1C}">
-                <a14:useLocalDpi xmlns:a14="http://schemas.microsoft.com/office/drawing/2010/main" val="0"/>
-              </a:ext>
-            </a:extLst>
-          </a:blip>
-          <a:stretch>
-            <a:fillRect/>
-          </a:stretch>
-        </p:blipFill>
-        <p:spPr>
-          <a:xfrm>
-            <a:off x="3954308" y="3132391"/>
-            <a:ext cx="114300" cy="132588"/>
-          </a:xfrm>
-          <a:prstGeom prst="rect">
-            <a:avLst/>
-          </a:prstGeom>
-        </p:spPr>
-      </p:pic>
       <p:sp>
         <p:nvSpPr>
           <p:cNvPr id="78" name="Cube 77"/>
@@ -8464,40 +8474,6 @@
           <a:chExt cx="0" cy="0"/>
         </a:xfrm>
       </p:grpSpPr>
-      <p:pic>
-        <p:nvPicPr>
-          <p:cNvPr id="98" name="Picture 97"/>
-          <p:cNvPicPr>
-            <a:picLocks noChangeAspect="1"/>
-          </p:cNvPicPr>
-          <p:nvPr>
-            <p:custDataLst>
-              <p:tags r:id="rId1"/>
-            </p:custDataLst>
-          </p:nvPr>
-        </p:nvPicPr>
-        <p:blipFill>
-          <a:blip r:embed="rId4" cstate="print">
-            <a:extLst>
-              <a:ext uri="{28A0092B-C50C-407E-A947-70E740481C1C}">
-                <a14:useLocalDpi xmlns:a14="http://schemas.microsoft.com/office/drawing/2010/main" val="0"/>
-              </a:ext>
-            </a:extLst>
-          </a:blip>
-          <a:stretch>
-            <a:fillRect/>
-          </a:stretch>
-        </p:blipFill>
-        <p:spPr>
-          <a:xfrm>
-            <a:off x="7970944" y="3272928"/>
-            <a:ext cx="114300" cy="132588"/>
-          </a:xfrm>
-          <a:prstGeom prst="rect">
-            <a:avLst/>
-          </a:prstGeom>
-        </p:spPr>
-      </p:pic>
       <p:sp>
         <p:nvSpPr>
           <p:cNvPr id="100" name="Cube 99"/>
@@ -8993,40 +8969,6 @@
           </a:p>
         </p:txBody>
       </p:sp>
-      <p:pic>
-        <p:nvPicPr>
-          <p:cNvPr id="43" name="Picture 42"/>
-          <p:cNvPicPr>
-            <a:picLocks noChangeAspect="1"/>
-          </p:cNvPicPr>
-          <p:nvPr>
-            <p:custDataLst>
-              <p:tags r:id="rId2"/>
-            </p:custDataLst>
-          </p:nvPr>
-        </p:nvPicPr>
-        <p:blipFill>
-          <a:blip r:embed="rId4" cstate="print">
-            <a:extLst>
-              <a:ext uri="{28A0092B-C50C-407E-A947-70E740481C1C}">
-                <a14:useLocalDpi xmlns:a14="http://schemas.microsoft.com/office/drawing/2010/main" val="0"/>
-              </a:ext>
-            </a:extLst>
-          </a:blip>
-          <a:stretch>
-            <a:fillRect/>
-          </a:stretch>
-        </p:blipFill>
-        <p:spPr>
-          <a:xfrm>
-            <a:off x="3954308" y="3132391"/>
-            <a:ext cx="114300" cy="132588"/>
-          </a:xfrm>
-          <a:prstGeom prst="rect">
-            <a:avLst/>
-          </a:prstGeom>
-        </p:spPr>
-      </p:pic>
       <p:sp>
         <p:nvSpPr>
           <p:cNvPr id="44" name="Cube 43"/>
@@ -9444,6 +9386,78 @@
           </a:p>
         </p:txBody>
       </p:sp>
+      <p:sp>
+        <p:nvSpPr>
+          <p:cNvPr id="37" name="TextBox 36">
+            <a:extLst>
+              <a:ext uri="{FF2B5EF4-FFF2-40B4-BE49-F238E27FC236}">
+                <a16:creationId xmlns:a16="http://schemas.microsoft.com/office/drawing/2014/main" id="{0E070568-9B11-49FA-9449-DD8A40817D13}"/>
+              </a:ext>
+            </a:extLst>
+          </p:cNvPr>
+          <p:cNvSpPr txBox="1"/>
+          <p:nvPr/>
+        </p:nvSpPr>
+        <p:spPr>
+          <a:xfrm>
+            <a:off x="7852741" y="3061449"/>
+            <a:ext cx="357790" cy="523220"/>
+          </a:xfrm>
+          <a:prstGeom prst="rect">
+            <a:avLst/>
+          </a:prstGeom>
+          <a:noFill/>
+        </p:spPr>
+        <p:txBody>
+          <a:bodyPr wrap="none" rtlCol="0">
+            <a:spAutoFit/>
+          </a:bodyPr>
+          <a:lstStyle/>
+          <a:p>
+            <a:r>
+              <a:rPr lang="en-US" sz="2800" dirty="0"/>
+              <a:t>∗</a:t>
+            </a:r>
+            <a:endParaRPr lang="en" sz="2800" dirty="0"/>
+          </a:p>
+        </p:txBody>
+      </p:sp>
+      <p:sp>
+        <p:nvSpPr>
+          <p:cNvPr id="38" name="TextBox 37">
+            <a:extLst>
+              <a:ext uri="{FF2B5EF4-FFF2-40B4-BE49-F238E27FC236}">
+                <a16:creationId xmlns:a16="http://schemas.microsoft.com/office/drawing/2014/main" id="{A54E5B0F-8580-4825-A8D5-E63F0E8FBA71}"/>
+              </a:ext>
+            </a:extLst>
+          </p:cNvPr>
+          <p:cNvSpPr txBox="1"/>
+          <p:nvPr/>
+        </p:nvSpPr>
+        <p:spPr>
+          <a:xfrm>
+            <a:off x="3836554" y="2918022"/>
+            <a:ext cx="357790" cy="523220"/>
+          </a:xfrm>
+          <a:prstGeom prst="rect">
+            <a:avLst/>
+          </a:prstGeom>
+          <a:noFill/>
+        </p:spPr>
+        <p:txBody>
+          <a:bodyPr wrap="none" rtlCol="0">
+            <a:spAutoFit/>
+          </a:bodyPr>
+          <a:lstStyle/>
+          <a:p>
+            <a:r>
+              <a:rPr lang="en-US" sz="2800" dirty="0"/>
+              <a:t>∗</a:t>
+            </a:r>
+            <a:endParaRPr lang="en" sz="2800" dirty="0"/>
+          </a:p>
+        </p:txBody>
+      </p:sp>
     </p:spTree>
     <p:extLst>
       <p:ext uri="{BB962C8B-B14F-4D97-AF65-F5344CB8AC3E}">
@@ -9484,6 +9498,42 @@
       </p:grpSpPr>
       <p:sp>
         <p:nvSpPr>
+          <p:cNvPr id="9" name="TextBox 8">
+            <a:extLst>
+              <a:ext uri="{FF2B5EF4-FFF2-40B4-BE49-F238E27FC236}">
+                <a16:creationId xmlns:a16="http://schemas.microsoft.com/office/drawing/2014/main" id="{AD5BE164-853A-4318-9B6B-19268629B257}"/>
+              </a:ext>
+            </a:extLst>
+          </p:cNvPr>
+          <p:cNvSpPr txBox="1"/>
+          <p:nvPr/>
+        </p:nvSpPr>
+        <p:spPr>
+          <a:xfrm>
+            <a:off x="3979982" y="2989735"/>
+            <a:ext cx="357790" cy="523220"/>
+          </a:xfrm>
+          <a:prstGeom prst="rect">
+            <a:avLst/>
+          </a:prstGeom>
+          <a:noFill/>
+        </p:spPr>
+        <p:txBody>
+          <a:bodyPr wrap="none" rtlCol="0">
+            <a:spAutoFit/>
+          </a:bodyPr>
+          <a:lstStyle/>
+          <a:p>
+            <a:r>
+              <a:rPr lang="en-US" sz="2800" dirty="0"/>
+              <a:t>∗</a:t>
+            </a:r>
+            <a:endParaRPr lang="en" sz="2800" dirty="0"/>
+          </a:p>
+        </p:txBody>
+      </p:sp>
+      <p:sp>
+        <p:nvSpPr>
           <p:cNvPr id="43" name="Cube 42"/>
           <p:cNvSpPr/>
           <p:nvPr/>
@@ -9588,40 +9638,6 @@
           </a:p>
         </p:txBody>
       </p:sp>
-      <p:pic>
-        <p:nvPicPr>
-          <p:cNvPr id="45" name="Picture 44"/>
-          <p:cNvPicPr>
-            <a:picLocks noChangeAspect="1"/>
-          </p:cNvPicPr>
-          <p:nvPr>
-            <p:custDataLst>
-              <p:tags r:id="rId1"/>
-            </p:custDataLst>
-          </p:nvPr>
-        </p:nvPicPr>
-        <p:blipFill>
-          <a:blip r:embed="rId3" cstate="print">
-            <a:extLst>
-              <a:ext uri="{28A0092B-C50C-407E-A947-70E740481C1C}">
-                <a14:useLocalDpi xmlns:a14="http://schemas.microsoft.com/office/drawing/2010/main" val="0"/>
-              </a:ext>
-            </a:extLst>
-          </a:blip>
-          <a:stretch>
-            <a:fillRect/>
-          </a:stretch>
-        </p:blipFill>
-        <p:spPr>
-          <a:xfrm>
-            <a:off x="4101821" y="3199308"/>
-            <a:ext cx="114300" cy="132588"/>
-          </a:xfrm>
-          <a:prstGeom prst="rect">
-            <a:avLst/>
-          </a:prstGeom>
-        </p:spPr>
-      </p:pic>
       <p:sp>
         <p:nvSpPr>
           <p:cNvPr id="46" name="TextBox 45"/>
@@ -9812,6 +9828,42 @@
       </p:grpSpPr>
       <p:sp>
         <p:nvSpPr>
+          <p:cNvPr id="14" name="TextBox 13">
+            <a:extLst>
+              <a:ext uri="{FF2B5EF4-FFF2-40B4-BE49-F238E27FC236}">
+                <a16:creationId xmlns:a16="http://schemas.microsoft.com/office/drawing/2014/main" id="{FC4F2A75-7542-47B0-95AB-4C388E60F740}"/>
+              </a:ext>
+            </a:extLst>
+          </p:cNvPr>
+          <p:cNvSpPr txBox="1"/>
+          <p:nvPr/>
+        </p:nvSpPr>
+        <p:spPr>
+          <a:xfrm>
+            <a:off x="3705051" y="2977783"/>
+            <a:ext cx="357790" cy="523220"/>
+          </a:xfrm>
+          <a:prstGeom prst="rect">
+            <a:avLst/>
+          </a:prstGeom>
+          <a:noFill/>
+        </p:spPr>
+        <p:txBody>
+          <a:bodyPr wrap="none" rtlCol="0">
+            <a:spAutoFit/>
+          </a:bodyPr>
+          <a:lstStyle/>
+          <a:p>
+            <a:r>
+              <a:rPr lang="en-US" sz="2800" dirty="0"/>
+              <a:t>∗</a:t>
+            </a:r>
+            <a:endParaRPr lang="en" sz="2800" dirty="0"/>
+          </a:p>
+        </p:txBody>
+      </p:sp>
+      <p:sp>
+        <p:nvSpPr>
           <p:cNvPr id="41" name="Cube 40"/>
           <p:cNvSpPr/>
           <p:nvPr/>
@@ -9934,40 +9986,6 @@
           </a:p>
         </p:txBody>
       </p:sp>
-      <p:pic>
-        <p:nvPicPr>
-          <p:cNvPr id="133" name="Picture 132"/>
-          <p:cNvPicPr>
-            <a:picLocks noChangeAspect="1"/>
-          </p:cNvPicPr>
-          <p:nvPr>
-            <p:custDataLst>
-              <p:tags r:id="rId1"/>
-            </p:custDataLst>
-          </p:nvPr>
-        </p:nvPicPr>
-        <p:blipFill>
-          <a:blip r:embed="rId3" cstate="print">
-            <a:extLst>
-              <a:ext uri="{28A0092B-C50C-407E-A947-70E740481C1C}">
-                <a14:useLocalDpi xmlns:a14="http://schemas.microsoft.com/office/drawing/2010/main" val="0"/>
-              </a:ext>
-            </a:extLst>
-          </a:blip>
-          <a:stretch>
-            <a:fillRect/>
-          </a:stretch>
-        </p:blipFill>
-        <p:spPr>
-          <a:xfrm>
-            <a:off x="3824768" y="3185731"/>
-            <a:ext cx="114300" cy="132588"/>
-          </a:xfrm>
-          <a:prstGeom prst="rect">
-            <a:avLst/>
-          </a:prstGeom>
-        </p:spPr>
-      </p:pic>
       <p:sp>
         <p:nvSpPr>
           <p:cNvPr id="43" name="Rectangle 42"/>
@@ -10528,6 +10546,42 @@
       </p:grpSpPr>
       <p:sp>
         <p:nvSpPr>
+          <p:cNvPr id="9" name="TextBox 8">
+            <a:extLst>
+              <a:ext uri="{FF2B5EF4-FFF2-40B4-BE49-F238E27FC236}">
+                <a16:creationId xmlns:a16="http://schemas.microsoft.com/office/drawing/2014/main" id="{E01576B7-B350-4623-90EF-7C85B06B176B}"/>
+              </a:ext>
+            </a:extLst>
+          </p:cNvPr>
+          <p:cNvSpPr txBox="1"/>
+          <p:nvPr/>
+        </p:nvSpPr>
+        <p:spPr>
+          <a:xfrm>
+            <a:off x="3938140" y="2971805"/>
+            <a:ext cx="357790" cy="523220"/>
+          </a:xfrm>
+          <a:prstGeom prst="rect">
+            <a:avLst/>
+          </a:prstGeom>
+          <a:noFill/>
+        </p:spPr>
+        <p:txBody>
+          <a:bodyPr wrap="none" rtlCol="0">
+            <a:spAutoFit/>
+          </a:bodyPr>
+          <a:lstStyle/>
+          <a:p>
+            <a:r>
+              <a:rPr lang="en-US" sz="2800" dirty="0"/>
+              <a:t>∗</a:t>
+            </a:r>
+            <a:endParaRPr lang="en" sz="2800" dirty="0"/>
+          </a:p>
+        </p:txBody>
+      </p:sp>
+      <p:sp>
+        <p:nvSpPr>
           <p:cNvPr id="147" name="Right Arrow 146"/>
           <p:cNvSpPr/>
           <p:nvPr/>
@@ -10600,40 +10654,6 @@
           </a:p>
         </p:txBody>
       </p:sp>
-      <p:pic>
-        <p:nvPicPr>
-          <p:cNvPr id="133" name="Picture 132"/>
-          <p:cNvPicPr>
-            <a:picLocks noChangeAspect="1"/>
-          </p:cNvPicPr>
-          <p:nvPr>
-            <p:custDataLst>
-              <p:tags r:id="rId1"/>
-            </p:custDataLst>
-          </p:nvPr>
-        </p:nvPicPr>
-        <p:blipFill>
-          <a:blip r:embed="rId3" cstate="print">
-            <a:extLst>
-              <a:ext uri="{28A0092B-C50C-407E-A947-70E740481C1C}">
-                <a14:useLocalDpi xmlns:a14="http://schemas.microsoft.com/office/drawing/2010/main" val="0"/>
-              </a:ext>
-            </a:extLst>
-          </a:blip>
-          <a:stretch>
-            <a:fillRect/>
-          </a:stretch>
-        </p:blipFill>
-        <p:spPr>
-          <a:xfrm>
-            <a:off x="4060988" y="3185731"/>
-            <a:ext cx="114300" cy="132588"/>
-          </a:xfrm>
-          <a:prstGeom prst="rect">
-            <a:avLst/>
-          </a:prstGeom>
-        </p:spPr>
-      </p:pic>
       <p:grpSp>
         <p:nvGrpSpPr>
           <p:cNvPr id="2" name="Group 1"/>
@@ -11507,6 +11527,42 @@
           <a:chExt cx="0" cy="0"/>
         </a:xfrm>
       </p:grpSpPr>
+      <p:sp>
+        <p:nvSpPr>
+          <p:cNvPr id="10" name="TextBox 9">
+            <a:extLst>
+              <a:ext uri="{FF2B5EF4-FFF2-40B4-BE49-F238E27FC236}">
+                <a16:creationId xmlns:a16="http://schemas.microsoft.com/office/drawing/2014/main" id="{C6BFA2CE-078D-4CB7-88E8-04D3DF4BB31D}"/>
+              </a:ext>
+            </a:extLst>
+          </p:cNvPr>
+          <p:cNvSpPr txBox="1"/>
+          <p:nvPr/>
+        </p:nvSpPr>
+        <p:spPr>
+          <a:xfrm>
+            <a:off x="3890337" y="2918020"/>
+            <a:ext cx="357790" cy="523220"/>
+          </a:xfrm>
+          <a:prstGeom prst="rect">
+            <a:avLst/>
+          </a:prstGeom>
+          <a:noFill/>
+        </p:spPr>
+        <p:txBody>
+          <a:bodyPr wrap="none" rtlCol="0">
+            <a:spAutoFit/>
+          </a:bodyPr>
+          <a:lstStyle/>
+          <a:p>
+            <a:r>
+              <a:rPr lang="en-US" sz="2800" dirty="0"/>
+              <a:t>∗</a:t>
+            </a:r>
+            <a:endParaRPr lang="en" sz="2800" dirty="0"/>
+          </a:p>
+        </p:txBody>
+      </p:sp>
       <p:grpSp>
         <p:nvGrpSpPr>
           <p:cNvPr id="3" name="Group 2"/>
@@ -11832,40 +11888,6 @@
           </p:txBody>
         </p:sp>
       </p:grpSp>
-      <p:pic>
-        <p:nvPicPr>
-          <p:cNvPr id="133" name="Picture 132"/>
-          <p:cNvPicPr>
-            <a:picLocks noChangeAspect="1"/>
-          </p:cNvPicPr>
-          <p:nvPr>
-            <p:custDataLst>
-              <p:tags r:id="rId1"/>
-            </p:custDataLst>
-          </p:nvPr>
-        </p:nvPicPr>
-        <p:blipFill>
-          <a:blip r:embed="rId3" cstate="print">
-            <a:extLst>
-              <a:ext uri="{28A0092B-C50C-407E-A947-70E740481C1C}">
-                <a14:useLocalDpi xmlns:a14="http://schemas.microsoft.com/office/drawing/2010/main" val="0"/>
-              </a:ext>
-            </a:extLst>
-          </a:blip>
-          <a:stretch>
-            <a:fillRect/>
-          </a:stretch>
-        </p:blipFill>
-        <p:spPr>
-          <a:xfrm>
-            <a:off x="4007648" y="3132391"/>
-            <a:ext cx="114300" cy="132588"/>
-          </a:xfrm>
-          <a:prstGeom prst="rect">
-            <a:avLst/>
-          </a:prstGeom>
-        </p:spPr>
-      </p:pic>
       <p:sp>
         <p:nvSpPr>
           <p:cNvPr id="32" name="Right Arrow 101"/>
@@ -12045,6 +12067,42 @@
           <a:chExt cx="0" cy="0"/>
         </a:xfrm>
       </p:grpSpPr>
+      <p:sp>
+        <p:nvSpPr>
+          <p:cNvPr id="22" name="TextBox 21">
+            <a:extLst>
+              <a:ext uri="{FF2B5EF4-FFF2-40B4-BE49-F238E27FC236}">
+                <a16:creationId xmlns:a16="http://schemas.microsoft.com/office/drawing/2014/main" id="{29DD8B3C-9C14-4EE9-9AEF-1D31550A3BFD}"/>
+              </a:ext>
+            </a:extLst>
+          </p:cNvPr>
+          <p:cNvSpPr txBox="1"/>
+          <p:nvPr/>
+        </p:nvSpPr>
+        <p:spPr>
+          <a:xfrm>
+            <a:off x="3890327" y="2918020"/>
+            <a:ext cx="357790" cy="523220"/>
+          </a:xfrm>
+          <a:prstGeom prst="rect">
+            <a:avLst/>
+          </a:prstGeom>
+          <a:noFill/>
+        </p:spPr>
+        <p:txBody>
+          <a:bodyPr wrap="none" rtlCol="0">
+            <a:spAutoFit/>
+          </a:bodyPr>
+          <a:lstStyle/>
+          <a:p>
+            <a:r>
+              <a:rPr lang="en-US" sz="2800" dirty="0"/>
+              <a:t>∗</a:t>
+            </a:r>
+            <a:endParaRPr lang="en" sz="2800" dirty="0"/>
+          </a:p>
+        </p:txBody>
+      </p:sp>
       <p:grpSp>
         <p:nvGrpSpPr>
           <p:cNvPr id="2" name="Group 1"/>
@@ -13420,40 +13478,6 @@
           </a:p>
         </p:txBody>
       </p:sp>
-      <p:pic>
-        <p:nvPicPr>
-          <p:cNvPr id="32" name="Picture 31"/>
-          <p:cNvPicPr>
-            <a:picLocks noChangeAspect="1"/>
-          </p:cNvPicPr>
-          <p:nvPr>
-            <p:custDataLst>
-              <p:tags r:id="rId1"/>
-            </p:custDataLst>
-          </p:nvPr>
-        </p:nvPicPr>
-        <p:blipFill>
-          <a:blip r:embed="rId3" cstate="print">
-            <a:extLst>
-              <a:ext uri="{28A0092B-C50C-407E-A947-70E740481C1C}">
-                <a14:useLocalDpi xmlns:a14="http://schemas.microsoft.com/office/drawing/2010/main" val="0"/>
-              </a:ext>
-            </a:extLst>
-          </a:blip>
-          <a:stretch>
-            <a:fillRect/>
-          </a:stretch>
-        </p:blipFill>
-        <p:spPr>
-          <a:xfrm>
-            <a:off x="4007648" y="3132391"/>
-            <a:ext cx="114300" cy="132588"/>
-          </a:xfrm>
-          <a:prstGeom prst="rect">
-            <a:avLst/>
-          </a:prstGeom>
-        </p:spPr>
-      </p:pic>
     </p:spTree>
     <p:extLst>
       <p:ext uri="{BB962C8B-B14F-4D97-AF65-F5344CB8AC3E}">
@@ -13486,6 +13510,42 @@
       </p:grpSpPr>
       <p:sp>
         <p:nvSpPr>
+          <p:cNvPr id="32" name="TextBox 31">
+            <a:extLst>
+              <a:ext uri="{FF2B5EF4-FFF2-40B4-BE49-F238E27FC236}">
+                <a16:creationId xmlns:a16="http://schemas.microsoft.com/office/drawing/2014/main" id="{4B15842B-816D-47C4-91F5-40A13A78C41D}"/>
+              </a:ext>
+            </a:extLst>
+          </p:cNvPr>
+          <p:cNvSpPr txBox="1"/>
+          <p:nvPr/>
+        </p:nvSpPr>
+        <p:spPr>
+          <a:xfrm>
+            <a:off x="3836586" y="2920336"/>
+            <a:ext cx="357790" cy="523220"/>
+          </a:xfrm>
+          <a:prstGeom prst="rect">
+            <a:avLst/>
+          </a:prstGeom>
+          <a:noFill/>
+        </p:spPr>
+        <p:txBody>
+          <a:bodyPr wrap="none" rtlCol="0">
+            <a:spAutoFit/>
+          </a:bodyPr>
+          <a:lstStyle/>
+          <a:p>
+            <a:r>
+              <a:rPr lang="en-US" sz="2800" dirty="0"/>
+              <a:t>∗</a:t>
+            </a:r>
+            <a:endParaRPr lang="en" sz="2800" dirty="0"/>
+          </a:p>
+        </p:txBody>
+      </p:sp>
+      <p:sp>
+        <p:nvSpPr>
           <p:cNvPr id="64" name="Cube 63"/>
           <p:cNvSpPr/>
           <p:nvPr/>
@@ -13791,40 +13851,6 @@
           </a:p>
         </p:txBody>
       </p:sp>
-      <p:pic>
-        <p:nvPicPr>
-          <p:cNvPr id="73" name="Picture 72"/>
-          <p:cNvPicPr>
-            <a:picLocks noChangeAspect="1"/>
-          </p:cNvPicPr>
-          <p:nvPr>
-            <p:custDataLst>
-              <p:tags r:id="rId1"/>
-            </p:custDataLst>
-          </p:nvPr>
-        </p:nvPicPr>
-        <p:blipFill>
-          <a:blip r:embed="rId3" cstate="print">
-            <a:extLst>
-              <a:ext uri="{28A0092B-C50C-407E-A947-70E740481C1C}">
-                <a14:useLocalDpi xmlns:a14="http://schemas.microsoft.com/office/drawing/2010/main" val="0"/>
-              </a:ext>
-            </a:extLst>
-          </a:blip>
-          <a:stretch>
-            <a:fillRect/>
-          </a:stretch>
-        </p:blipFill>
-        <p:spPr>
-          <a:xfrm>
-            <a:off x="3954308" y="3132391"/>
-            <a:ext cx="114300" cy="132588"/>
-          </a:xfrm>
-          <a:prstGeom prst="rect">
-            <a:avLst/>
-          </a:prstGeom>
-        </p:spPr>
-      </p:pic>
       <p:sp>
         <p:nvSpPr>
           <p:cNvPr id="74" name="TextBox 73"/>
@@ -15060,40 +15086,42 @@
           <a:chExt cx="0" cy="0"/>
         </a:xfrm>
       </p:grpSpPr>
-      <p:pic>
-        <p:nvPicPr>
-          <p:cNvPr id="45" name="Picture 44"/>
-          <p:cNvPicPr>
-            <a:picLocks noChangeAspect="1"/>
-          </p:cNvPicPr>
-          <p:nvPr>
-            <p:custDataLst>
-              <p:tags r:id="rId1"/>
-            </p:custDataLst>
-          </p:nvPr>
-        </p:nvPicPr>
-        <p:blipFill>
-          <a:blip r:embed="rId3" cstate="print">
+      <p:sp>
+        <p:nvSpPr>
+          <p:cNvPr id="10" name="TextBox 9">
             <a:extLst>
-              <a:ext uri="{28A0092B-C50C-407E-A947-70E740481C1C}">
-                <a14:useLocalDpi xmlns:a14="http://schemas.microsoft.com/office/drawing/2010/main" val="0"/>
+              <a:ext uri="{FF2B5EF4-FFF2-40B4-BE49-F238E27FC236}">
+                <a16:creationId xmlns:a16="http://schemas.microsoft.com/office/drawing/2014/main" id="{56D2D0D5-8810-4D1E-9CD2-D79BEF67FF98}"/>
               </a:ext>
             </a:extLst>
-          </a:blip>
-          <a:stretch>
-            <a:fillRect/>
-          </a:stretch>
-        </p:blipFill>
-        <p:spPr>
-          <a:xfrm>
-            <a:off x="4322801" y="3199308"/>
-            <a:ext cx="114300" cy="132588"/>
+          </p:cNvPr>
+          <p:cNvSpPr txBox="1"/>
+          <p:nvPr/>
+        </p:nvSpPr>
+        <p:spPr>
+          <a:xfrm>
+            <a:off x="4201099" y="2983759"/>
+            <a:ext cx="357790" cy="523220"/>
           </a:xfrm>
           <a:prstGeom prst="rect">
             <a:avLst/>
           </a:prstGeom>
-        </p:spPr>
-      </p:pic>
+          <a:noFill/>
+        </p:spPr>
+        <p:txBody>
+          <a:bodyPr wrap="none" rtlCol="0">
+            <a:spAutoFit/>
+          </a:bodyPr>
+          <a:lstStyle/>
+          <a:p>
+            <a:r>
+              <a:rPr lang="en-US" sz="2800" dirty="0"/>
+              <a:t>∗</a:t>
+            </a:r>
+            <a:endParaRPr lang="en" sz="2800" dirty="0"/>
+          </a:p>
+        </p:txBody>
+      </p:sp>
       <p:grpSp>
         <p:nvGrpSpPr>
           <p:cNvPr id="2" name="Group 1"/>
@@ -15546,6 +15574,42 @@
       </p:grpSpPr>
       <p:sp>
         <p:nvSpPr>
+          <p:cNvPr id="43" name="TextBox 42">
+            <a:extLst>
+              <a:ext uri="{FF2B5EF4-FFF2-40B4-BE49-F238E27FC236}">
+                <a16:creationId xmlns:a16="http://schemas.microsoft.com/office/drawing/2014/main" id="{92F43B35-DA7F-4A5B-BCF2-29A3730CFF51}"/>
+              </a:ext>
+            </a:extLst>
+          </p:cNvPr>
+          <p:cNvSpPr txBox="1"/>
+          <p:nvPr/>
+        </p:nvSpPr>
+        <p:spPr>
+          <a:xfrm>
+            <a:off x="5539828" y="2918020"/>
+            <a:ext cx="357790" cy="523220"/>
+          </a:xfrm>
+          <a:prstGeom prst="rect">
+            <a:avLst/>
+          </a:prstGeom>
+          <a:noFill/>
+        </p:spPr>
+        <p:txBody>
+          <a:bodyPr wrap="none" rtlCol="0">
+            <a:spAutoFit/>
+          </a:bodyPr>
+          <a:lstStyle/>
+          <a:p>
+            <a:r>
+              <a:rPr lang="en-US" sz="2800" dirty="0"/>
+              <a:t>∗</a:t>
+            </a:r>
+            <a:endParaRPr lang="en" sz="2800" dirty="0"/>
+          </a:p>
+        </p:txBody>
+      </p:sp>
+      <p:sp>
+        <p:nvSpPr>
           <p:cNvPr id="100" name="Cube 99"/>
           <p:cNvSpPr/>
           <p:nvPr/>
@@ -15706,40 +15770,6 @@
           </a:p>
         </p:txBody>
       </p:sp>
-      <p:pic>
-        <p:nvPicPr>
-          <p:cNvPr id="133" name="Picture 132"/>
-          <p:cNvPicPr>
-            <a:picLocks noChangeAspect="1"/>
-          </p:cNvPicPr>
-          <p:nvPr>
-            <p:custDataLst>
-              <p:tags r:id="rId1"/>
-            </p:custDataLst>
-          </p:nvPr>
-        </p:nvPicPr>
-        <p:blipFill>
-          <a:blip r:embed="rId3" cstate="print">
-            <a:extLst>
-              <a:ext uri="{28A0092B-C50C-407E-A947-70E740481C1C}">
-                <a14:useLocalDpi xmlns:a14="http://schemas.microsoft.com/office/drawing/2010/main" val="0"/>
-              </a:ext>
-            </a:extLst>
-          </a:blip>
-          <a:stretch>
-            <a:fillRect/>
-          </a:stretch>
-        </p:blipFill>
-        <p:spPr>
-          <a:xfrm>
-            <a:off x="5657593" y="3132391"/>
-            <a:ext cx="114300" cy="132588"/>
-          </a:xfrm>
-          <a:prstGeom prst="rect">
-            <a:avLst/>
-          </a:prstGeom>
-        </p:spPr>
-      </p:pic>
       <p:sp>
         <p:nvSpPr>
           <p:cNvPr id="129" name="Cube 128"/>
@@ -15994,6 +16024,42 @@
       </p:grpSpPr>
       <p:sp>
         <p:nvSpPr>
+          <p:cNvPr id="2" name="TextBox 1">
+            <a:extLst>
+              <a:ext uri="{FF2B5EF4-FFF2-40B4-BE49-F238E27FC236}">
+                <a16:creationId xmlns:a16="http://schemas.microsoft.com/office/drawing/2014/main" id="{1362ED5B-96E7-4B45-BD12-ABF096F5312D}"/>
+              </a:ext>
+            </a:extLst>
+          </p:cNvPr>
+          <p:cNvSpPr txBox="1"/>
+          <p:nvPr/>
+        </p:nvSpPr>
+        <p:spPr>
+          <a:xfrm>
+            <a:off x="5539828" y="2918020"/>
+            <a:ext cx="357790" cy="523220"/>
+          </a:xfrm>
+          <a:prstGeom prst="rect">
+            <a:avLst/>
+          </a:prstGeom>
+          <a:noFill/>
+        </p:spPr>
+        <p:txBody>
+          <a:bodyPr wrap="none" rtlCol="0">
+            <a:spAutoFit/>
+          </a:bodyPr>
+          <a:lstStyle/>
+          <a:p>
+            <a:r>
+              <a:rPr lang="en-US" sz="2800" dirty="0"/>
+              <a:t>∗</a:t>
+            </a:r>
+            <a:endParaRPr lang="en" sz="2800" dirty="0"/>
+          </a:p>
+        </p:txBody>
+      </p:sp>
+      <p:sp>
+        <p:nvSpPr>
           <p:cNvPr id="100" name="Cube 99"/>
           <p:cNvSpPr/>
           <p:nvPr/>
@@ -16352,6 +16418,42 @@
       </p:grpSpPr>
       <p:sp>
         <p:nvSpPr>
+          <p:cNvPr id="24" name="TextBox 23">
+            <a:extLst>
+              <a:ext uri="{FF2B5EF4-FFF2-40B4-BE49-F238E27FC236}">
+                <a16:creationId xmlns:a16="http://schemas.microsoft.com/office/drawing/2014/main" id="{2208DB1D-6CE2-437D-A294-7EC44FED8254}"/>
+              </a:ext>
+            </a:extLst>
+          </p:cNvPr>
+          <p:cNvSpPr txBox="1"/>
+          <p:nvPr/>
+        </p:nvSpPr>
+        <p:spPr>
+          <a:xfrm>
+            <a:off x="5121531" y="3093644"/>
+            <a:ext cx="357790" cy="523220"/>
+          </a:xfrm>
+          <a:prstGeom prst="rect">
+            <a:avLst/>
+          </a:prstGeom>
+          <a:noFill/>
+        </p:spPr>
+        <p:txBody>
+          <a:bodyPr wrap="none" rtlCol="0">
+            <a:spAutoFit/>
+          </a:bodyPr>
+          <a:lstStyle/>
+          <a:p>
+            <a:r>
+              <a:rPr lang="en-US" sz="2800" dirty="0"/>
+              <a:t>∗</a:t>
+            </a:r>
+            <a:endParaRPr lang="en" sz="2800" dirty="0"/>
+          </a:p>
+        </p:txBody>
+      </p:sp>
+      <p:sp>
+        <p:nvSpPr>
           <p:cNvPr id="55" name="Cube 54"/>
           <p:cNvSpPr/>
           <p:nvPr/>
@@ -16400,40 +16502,6 @@
           </a:p>
         </p:txBody>
       </p:sp>
-      <p:pic>
-        <p:nvPicPr>
-          <p:cNvPr id="57" name="Picture 56"/>
-          <p:cNvPicPr>
-            <a:picLocks noChangeAspect="1"/>
-          </p:cNvPicPr>
-          <p:nvPr>
-            <p:custDataLst>
-              <p:tags r:id="rId1"/>
-            </p:custDataLst>
-          </p:nvPr>
-        </p:nvPicPr>
-        <p:blipFill>
-          <a:blip r:embed="rId3" cstate="print">
-            <a:extLst>
-              <a:ext uri="{28A0092B-C50C-407E-A947-70E740481C1C}">
-                <a14:useLocalDpi xmlns:a14="http://schemas.microsoft.com/office/drawing/2010/main" val="0"/>
-              </a:ext>
-            </a:extLst>
-          </a:blip>
-          <a:stretch>
-            <a:fillRect/>
-          </a:stretch>
-        </p:blipFill>
-        <p:spPr>
-          <a:xfrm>
-            <a:off x="5243128" y="3301860"/>
-            <a:ext cx="114300" cy="132588"/>
-          </a:xfrm>
-          <a:prstGeom prst="rect">
-            <a:avLst/>
-          </a:prstGeom>
-        </p:spPr>
-      </p:pic>
       <p:sp>
         <p:nvSpPr>
           <p:cNvPr id="59" name="Cube 58"/>
@@ -17226,40 +17294,6 @@
           </a:p>
         </p:txBody>
       </p:sp>
-      <p:pic>
-        <p:nvPicPr>
-          <p:cNvPr id="98" name="Picture 97"/>
-          <p:cNvPicPr>
-            <a:picLocks noChangeAspect="1"/>
-          </p:cNvPicPr>
-          <p:nvPr>
-            <p:custDataLst>
-              <p:tags r:id="rId1"/>
-            </p:custDataLst>
-          </p:nvPr>
-        </p:nvPicPr>
-        <p:blipFill>
-          <a:blip r:embed="rId4" cstate="print">
-            <a:extLst>
-              <a:ext uri="{28A0092B-C50C-407E-A947-70E740481C1C}">
-                <a14:useLocalDpi xmlns:a14="http://schemas.microsoft.com/office/drawing/2010/main" val="0"/>
-              </a:ext>
-            </a:extLst>
-          </a:blip>
-          <a:stretch>
-            <a:fillRect/>
-          </a:stretch>
-        </p:blipFill>
-        <p:spPr>
-          <a:xfrm>
-            <a:off x="7970944" y="3272928"/>
-            <a:ext cx="114300" cy="132588"/>
-          </a:xfrm>
-          <a:prstGeom prst="rect">
-            <a:avLst/>
-          </a:prstGeom>
-        </p:spPr>
-      </p:pic>
       <p:sp>
         <p:nvSpPr>
           <p:cNvPr id="100" name="Cube 99"/>
@@ -17465,40 +17499,6 @@
           </a:p>
         </p:txBody>
       </p:sp>
-      <p:pic>
-        <p:nvPicPr>
-          <p:cNvPr id="133" name="Picture 132"/>
-          <p:cNvPicPr>
-            <a:picLocks noChangeAspect="1"/>
-          </p:cNvPicPr>
-          <p:nvPr>
-            <p:custDataLst>
-              <p:tags r:id="rId2"/>
-            </p:custDataLst>
-          </p:nvPr>
-        </p:nvPicPr>
-        <p:blipFill>
-          <a:blip r:embed="rId4" cstate="print">
-            <a:extLst>
-              <a:ext uri="{28A0092B-C50C-407E-A947-70E740481C1C}">
-                <a14:useLocalDpi xmlns:a14="http://schemas.microsoft.com/office/drawing/2010/main" val="0"/>
-              </a:ext>
-            </a:extLst>
-          </a:blip>
-          <a:stretch>
-            <a:fillRect/>
-          </a:stretch>
-        </p:blipFill>
-        <p:spPr>
-          <a:xfrm>
-            <a:off x="3954308" y="3132391"/>
-            <a:ext cx="114300" cy="132588"/>
-          </a:xfrm>
-          <a:prstGeom prst="rect">
-            <a:avLst/>
-          </a:prstGeom>
-        </p:spPr>
-      </p:pic>
       <p:sp>
         <p:nvSpPr>
           <p:cNvPr id="138" name="TextBox 137"/>
@@ -18655,6 +18655,78 @@
           </a:p>
         </p:txBody>
       </p:sp>
+      <p:sp>
+        <p:nvSpPr>
+          <p:cNvPr id="40" name="TextBox 39">
+            <a:extLst>
+              <a:ext uri="{FF2B5EF4-FFF2-40B4-BE49-F238E27FC236}">
+                <a16:creationId xmlns:a16="http://schemas.microsoft.com/office/drawing/2014/main" id="{500AFC6D-971D-4BF8-AFE0-987200C804B0}"/>
+              </a:ext>
+            </a:extLst>
+          </p:cNvPr>
+          <p:cNvSpPr txBox="1"/>
+          <p:nvPr/>
+        </p:nvSpPr>
+        <p:spPr>
+          <a:xfrm>
+            <a:off x="7852741" y="3061449"/>
+            <a:ext cx="357790" cy="523220"/>
+          </a:xfrm>
+          <a:prstGeom prst="rect">
+            <a:avLst/>
+          </a:prstGeom>
+          <a:noFill/>
+        </p:spPr>
+        <p:txBody>
+          <a:bodyPr wrap="none" rtlCol="0">
+            <a:spAutoFit/>
+          </a:bodyPr>
+          <a:lstStyle/>
+          <a:p>
+            <a:r>
+              <a:rPr lang="en-US" sz="2800" dirty="0"/>
+              <a:t>∗</a:t>
+            </a:r>
+            <a:endParaRPr lang="en" sz="2800" dirty="0"/>
+          </a:p>
+        </p:txBody>
+      </p:sp>
+      <p:sp>
+        <p:nvSpPr>
+          <p:cNvPr id="43" name="TextBox 42">
+            <a:extLst>
+              <a:ext uri="{FF2B5EF4-FFF2-40B4-BE49-F238E27FC236}">
+                <a16:creationId xmlns:a16="http://schemas.microsoft.com/office/drawing/2014/main" id="{C116062A-E28F-402C-B6CF-F391F6E2E298}"/>
+              </a:ext>
+            </a:extLst>
+          </p:cNvPr>
+          <p:cNvSpPr txBox="1"/>
+          <p:nvPr/>
+        </p:nvSpPr>
+        <p:spPr>
+          <a:xfrm>
+            <a:off x="3836554" y="2918022"/>
+            <a:ext cx="357790" cy="523220"/>
+          </a:xfrm>
+          <a:prstGeom prst="rect">
+            <a:avLst/>
+          </a:prstGeom>
+          <a:noFill/>
+        </p:spPr>
+        <p:txBody>
+          <a:bodyPr wrap="none" rtlCol="0">
+            <a:spAutoFit/>
+          </a:bodyPr>
+          <a:lstStyle/>
+          <a:p>
+            <a:r>
+              <a:rPr lang="en-US" sz="2800" dirty="0"/>
+              <a:t>∗</a:t>
+            </a:r>
+            <a:endParaRPr lang="en" sz="2800" dirty="0"/>
+          </a:p>
+        </p:txBody>
+      </p:sp>
     </p:spTree>
     <p:extLst>
       <p:ext uri="{BB962C8B-B14F-4D97-AF65-F5344CB8AC3E}">
@@ -19000,40 +19072,6 @@
           </a:p>
         </p:txBody>
       </p:sp>
-      <p:pic>
-        <p:nvPicPr>
-          <p:cNvPr id="98" name="Picture 97"/>
-          <p:cNvPicPr>
-            <a:picLocks noChangeAspect="1"/>
-          </p:cNvPicPr>
-          <p:nvPr>
-            <p:custDataLst>
-              <p:tags r:id="rId1"/>
-            </p:custDataLst>
-          </p:nvPr>
-        </p:nvPicPr>
-        <p:blipFill>
-          <a:blip r:embed="rId4" cstate="print">
-            <a:extLst>
-              <a:ext uri="{28A0092B-C50C-407E-A947-70E740481C1C}">
-                <a14:useLocalDpi xmlns:a14="http://schemas.microsoft.com/office/drawing/2010/main" val="0"/>
-              </a:ext>
-            </a:extLst>
-          </a:blip>
-          <a:stretch>
-            <a:fillRect/>
-          </a:stretch>
-        </p:blipFill>
-        <p:spPr>
-          <a:xfrm>
-            <a:off x="7970944" y="3272928"/>
-            <a:ext cx="114300" cy="132588"/>
-          </a:xfrm>
-          <a:prstGeom prst="rect">
-            <a:avLst/>
-          </a:prstGeom>
-        </p:spPr>
-      </p:pic>
       <p:sp>
         <p:nvSpPr>
           <p:cNvPr id="100" name="Cube 99"/>
@@ -19196,40 +19234,6 @@
           </a:p>
         </p:txBody>
       </p:sp>
-      <p:pic>
-        <p:nvPicPr>
-          <p:cNvPr id="133" name="Picture 132"/>
-          <p:cNvPicPr>
-            <a:picLocks noChangeAspect="1"/>
-          </p:cNvPicPr>
-          <p:nvPr>
-            <p:custDataLst>
-              <p:tags r:id="rId2"/>
-            </p:custDataLst>
-          </p:nvPr>
-        </p:nvPicPr>
-        <p:blipFill>
-          <a:blip r:embed="rId4" cstate="print">
-            <a:extLst>
-              <a:ext uri="{28A0092B-C50C-407E-A947-70E740481C1C}">
-                <a14:useLocalDpi xmlns:a14="http://schemas.microsoft.com/office/drawing/2010/main" val="0"/>
-              </a:ext>
-            </a:extLst>
-          </a:blip>
-          <a:stretch>
-            <a:fillRect/>
-          </a:stretch>
-        </p:blipFill>
-        <p:spPr>
-          <a:xfrm>
-            <a:off x="3954308" y="3132391"/>
-            <a:ext cx="114300" cy="132588"/>
-          </a:xfrm>
-          <a:prstGeom prst="rect">
-            <a:avLst/>
-          </a:prstGeom>
-        </p:spPr>
-      </p:pic>
       <p:sp>
         <p:nvSpPr>
           <p:cNvPr id="138" name="TextBox 137"/>
@@ -20818,6 +20822,78 @@
           </a:p>
         </p:txBody>
       </p:sp>
+      <p:sp>
+        <p:nvSpPr>
+          <p:cNvPr id="62" name="TextBox 61">
+            <a:extLst>
+              <a:ext uri="{FF2B5EF4-FFF2-40B4-BE49-F238E27FC236}">
+                <a16:creationId xmlns:a16="http://schemas.microsoft.com/office/drawing/2014/main" id="{2635D219-59A0-4512-9938-CB4C52B1C86D}"/>
+              </a:ext>
+            </a:extLst>
+          </p:cNvPr>
+          <p:cNvSpPr txBox="1"/>
+          <p:nvPr/>
+        </p:nvSpPr>
+        <p:spPr>
+          <a:xfrm>
+            <a:off x="7852741" y="3061449"/>
+            <a:ext cx="357790" cy="523220"/>
+          </a:xfrm>
+          <a:prstGeom prst="rect">
+            <a:avLst/>
+          </a:prstGeom>
+          <a:noFill/>
+        </p:spPr>
+        <p:txBody>
+          <a:bodyPr wrap="none" rtlCol="0">
+            <a:spAutoFit/>
+          </a:bodyPr>
+          <a:lstStyle/>
+          <a:p>
+            <a:r>
+              <a:rPr lang="en-US" sz="2800" dirty="0"/>
+              <a:t>∗</a:t>
+            </a:r>
+            <a:endParaRPr lang="en" sz="2800" dirty="0"/>
+          </a:p>
+        </p:txBody>
+      </p:sp>
+      <p:sp>
+        <p:nvSpPr>
+          <p:cNvPr id="63" name="TextBox 62">
+            <a:extLst>
+              <a:ext uri="{FF2B5EF4-FFF2-40B4-BE49-F238E27FC236}">
+                <a16:creationId xmlns:a16="http://schemas.microsoft.com/office/drawing/2014/main" id="{65D1A70E-54FF-46D1-B421-363906233C13}"/>
+              </a:ext>
+            </a:extLst>
+          </p:cNvPr>
+          <p:cNvSpPr txBox="1"/>
+          <p:nvPr/>
+        </p:nvSpPr>
+        <p:spPr>
+          <a:xfrm>
+            <a:off x="3836554" y="2918022"/>
+            <a:ext cx="357790" cy="523220"/>
+          </a:xfrm>
+          <a:prstGeom prst="rect">
+            <a:avLst/>
+          </a:prstGeom>
+          <a:noFill/>
+        </p:spPr>
+        <p:txBody>
+          <a:bodyPr wrap="none" rtlCol="0">
+            <a:spAutoFit/>
+          </a:bodyPr>
+          <a:lstStyle/>
+          <a:p>
+            <a:r>
+              <a:rPr lang="en-US" sz="2800" dirty="0"/>
+              <a:t>∗</a:t>
+            </a:r>
+            <a:endParaRPr lang="en" sz="2800" dirty="0"/>
+          </a:p>
+        </p:txBody>
+      </p:sp>
     </p:spTree>
     <p:extLst>
       <p:ext uri="{BB962C8B-B14F-4D97-AF65-F5344CB8AC3E}">
@@ -21359,40 +21435,6 @@
           </a:p>
         </p:txBody>
       </p:sp>
-      <p:pic>
-        <p:nvPicPr>
-          <p:cNvPr id="98" name="Picture 97"/>
-          <p:cNvPicPr>
-            <a:picLocks noChangeAspect="1"/>
-          </p:cNvPicPr>
-          <p:nvPr>
-            <p:custDataLst>
-              <p:tags r:id="rId1"/>
-            </p:custDataLst>
-          </p:nvPr>
-        </p:nvPicPr>
-        <p:blipFill>
-          <a:blip r:embed="rId4" cstate="print">
-            <a:extLst>
-              <a:ext uri="{28A0092B-C50C-407E-A947-70E740481C1C}">
-                <a14:useLocalDpi xmlns:a14="http://schemas.microsoft.com/office/drawing/2010/main" val="0"/>
-              </a:ext>
-            </a:extLst>
-          </a:blip>
-          <a:stretch>
-            <a:fillRect/>
-          </a:stretch>
-        </p:blipFill>
-        <p:spPr>
-          <a:xfrm>
-            <a:off x="7970944" y="3272928"/>
-            <a:ext cx="114300" cy="132588"/>
-          </a:xfrm>
-          <a:prstGeom prst="rect">
-            <a:avLst/>
-          </a:prstGeom>
-        </p:spPr>
-      </p:pic>
       <p:sp>
         <p:nvSpPr>
           <p:cNvPr id="100" name="Cube 99"/>
@@ -21639,40 +21681,6 @@
           </a:p>
         </p:txBody>
       </p:sp>
-      <p:pic>
-        <p:nvPicPr>
-          <p:cNvPr id="133" name="Picture 132"/>
-          <p:cNvPicPr>
-            <a:picLocks noChangeAspect="1"/>
-          </p:cNvPicPr>
-          <p:nvPr>
-            <p:custDataLst>
-              <p:tags r:id="rId2"/>
-            </p:custDataLst>
-          </p:nvPr>
-        </p:nvPicPr>
-        <p:blipFill>
-          <a:blip r:embed="rId4" cstate="print">
-            <a:extLst>
-              <a:ext uri="{28A0092B-C50C-407E-A947-70E740481C1C}">
-                <a14:useLocalDpi xmlns:a14="http://schemas.microsoft.com/office/drawing/2010/main" val="0"/>
-              </a:ext>
-            </a:extLst>
-          </a:blip>
-          <a:stretch>
-            <a:fillRect/>
-          </a:stretch>
-        </p:blipFill>
-        <p:spPr>
-          <a:xfrm>
-            <a:off x="3954308" y="3132391"/>
-            <a:ext cx="114300" cy="132588"/>
-          </a:xfrm>
-          <a:prstGeom prst="rect">
-            <a:avLst/>
-          </a:prstGeom>
-        </p:spPr>
-      </p:pic>
       <p:sp>
         <p:nvSpPr>
           <p:cNvPr id="138" name="TextBox 137"/>
@@ -24153,6 +24161,78 @@
           </a:p>
         </p:txBody>
       </p:sp>
+      <p:sp>
+        <p:nvSpPr>
+          <p:cNvPr id="69" name="TextBox 68">
+            <a:extLst>
+              <a:ext uri="{FF2B5EF4-FFF2-40B4-BE49-F238E27FC236}">
+                <a16:creationId xmlns:a16="http://schemas.microsoft.com/office/drawing/2014/main" id="{10ED2E07-783C-4ECE-AA89-5F09F1C0FE17}"/>
+              </a:ext>
+            </a:extLst>
+          </p:cNvPr>
+          <p:cNvSpPr txBox="1"/>
+          <p:nvPr/>
+        </p:nvSpPr>
+        <p:spPr>
+          <a:xfrm>
+            <a:off x="7852741" y="3061449"/>
+            <a:ext cx="357790" cy="523220"/>
+          </a:xfrm>
+          <a:prstGeom prst="rect">
+            <a:avLst/>
+          </a:prstGeom>
+          <a:noFill/>
+        </p:spPr>
+        <p:txBody>
+          <a:bodyPr wrap="none" rtlCol="0">
+            <a:spAutoFit/>
+          </a:bodyPr>
+          <a:lstStyle/>
+          <a:p>
+            <a:r>
+              <a:rPr lang="en-US" sz="2800" dirty="0"/>
+              <a:t>∗</a:t>
+            </a:r>
+            <a:endParaRPr lang="en" sz="2800" dirty="0"/>
+          </a:p>
+        </p:txBody>
+      </p:sp>
+      <p:sp>
+        <p:nvSpPr>
+          <p:cNvPr id="91" name="TextBox 90">
+            <a:extLst>
+              <a:ext uri="{FF2B5EF4-FFF2-40B4-BE49-F238E27FC236}">
+                <a16:creationId xmlns:a16="http://schemas.microsoft.com/office/drawing/2014/main" id="{23D545BB-9BE5-40B3-A97C-F0D73138478D}"/>
+              </a:ext>
+            </a:extLst>
+          </p:cNvPr>
+          <p:cNvSpPr txBox="1"/>
+          <p:nvPr/>
+        </p:nvSpPr>
+        <p:spPr>
+          <a:xfrm>
+            <a:off x="3836554" y="2918022"/>
+            <a:ext cx="357790" cy="523220"/>
+          </a:xfrm>
+          <a:prstGeom prst="rect">
+            <a:avLst/>
+          </a:prstGeom>
+          <a:noFill/>
+        </p:spPr>
+        <p:txBody>
+          <a:bodyPr wrap="none" rtlCol="0">
+            <a:spAutoFit/>
+          </a:bodyPr>
+          <a:lstStyle/>
+          <a:p>
+            <a:r>
+              <a:rPr lang="en-US" sz="2800" dirty="0"/>
+              <a:t>∗</a:t>
+            </a:r>
+            <a:endParaRPr lang="en" sz="2800" dirty="0"/>
+          </a:p>
+        </p:txBody>
+      </p:sp>
     </p:spTree>
     <p:extLst>
       <p:ext uri="{BB962C8B-B14F-4D97-AF65-F5344CB8AC3E}">
@@ -24307,40 +24387,6 @@
           </a:p>
         </p:txBody>
       </p:sp>
-      <p:pic>
-        <p:nvPicPr>
-          <p:cNvPr id="133" name="Picture 132"/>
-          <p:cNvPicPr>
-            <a:picLocks noChangeAspect="1"/>
-          </p:cNvPicPr>
-          <p:nvPr>
-            <p:custDataLst>
-              <p:tags r:id="rId1"/>
-            </p:custDataLst>
-          </p:nvPr>
-        </p:nvPicPr>
-        <p:blipFill>
-          <a:blip r:embed="rId3" cstate="print">
-            <a:extLst>
-              <a:ext uri="{28A0092B-C50C-407E-A947-70E740481C1C}">
-                <a14:useLocalDpi xmlns:a14="http://schemas.microsoft.com/office/drawing/2010/main" val="0"/>
-              </a:ext>
-            </a:extLst>
-          </a:blip>
-          <a:stretch>
-            <a:fillRect/>
-          </a:stretch>
-        </p:blipFill>
-        <p:spPr>
-          <a:xfrm>
-            <a:off x="3954308" y="3132391"/>
-            <a:ext cx="114300" cy="132588"/>
-          </a:xfrm>
-          <a:prstGeom prst="rect">
-            <a:avLst/>
-          </a:prstGeom>
-        </p:spPr>
-      </p:pic>
       <p:sp>
         <p:nvSpPr>
           <p:cNvPr id="163" name="TextBox 162"/>
@@ -25029,6 +25075,42 @@
           </a:p>
         </p:txBody>
       </p:sp>
+      <p:sp>
+        <p:nvSpPr>
+          <p:cNvPr id="19" name="TextBox 18">
+            <a:extLst>
+              <a:ext uri="{FF2B5EF4-FFF2-40B4-BE49-F238E27FC236}">
+                <a16:creationId xmlns:a16="http://schemas.microsoft.com/office/drawing/2014/main" id="{C551BD07-4B2A-42A0-B115-252520B2BAE9}"/>
+              </a:ext>
+            </a:extLst>
+          </p:cNvPr>
+          <p:cNvSpPr txBox="1"/>
+          <p:nvPr/>
+        </p:nvSpPr>
+        <p:spPr>
+          <a:xfrm>
+            <a:off x="3836554" y="2918022"/>
+            <a:ext cx="357790" cy="523220"/>
+          </a:xfrm>
+          <a:prstGeom prst="rect">
+            <a:avLst/>
+          </a:prstGeom>
+          <a:noFill/>
+        </p:spPr>
+        <p:txBody>
+          <a:bodyPr wrap="none" rtlCol="0">
+            <a:spAutoFit/>
+          </a:bodyPr>
+          <a:lstStyle/>
+          <a:p>
+            <a:r>
+              <a:rPr lang="en-US" sz="2800" dirty="0"/>
+              <a:t>∗</a:t>
+            </a:r>
+            <a:endParaRPr lang="en" sz="2800" dirty="0"/>
+          </a:p>
+        </p:txBody>
+      </p:sp>
     </p:spTree>
     <p:extLst>
       <p:ext uri="{BB962C8B-B14F-4D97-AF65-F5344CB8AC3E}">
@@ -25183,40 +25265,6 @@
           </a:p>
         </p:txBody>
       </p:sp>
-      <p:pic>
-        <p:nvPicPr>
-          <p:cNvPr id="98" name="Picture 97"/>
-          <p:cNvPicPr>
-            <a:picLocks noChangeAspect="1"/>
-          </p:cNvPicPr>
-          <p:nvPr>
-            <p:custDataLst>
-              <p:tags r:id="rId1"/>
-            </p:custDataLst>
-          </p:nvPr>
-        </p:nvPicPr>
-        <p:blipFill>
-          <a:blip r:embed="rId4" cstate="print">
-            <a:extLst>
-              <a:ext uri="{28A0092B-C50C-407E-A947-70E740481C1C}">
-                <a14:useLocalDpi xmlns:a14="http://schemas.microsoft.com/office/drawing/2010/main" val="0"/>
-              </a:ext>
-            </a:extLst>
-          </a:blip>
-          <a:stretch>
-            <a:fillRect/>
-          </a:stretch>
-        </p:blipFill>
-        <p:spPr>
-          <a:xfrm>
-            <a:off x="7970944" y="3272928"/>
-            <a:ext cx="114300" cy="132588"/>
-          </a:xfrm>
-          <a:prstGeom prst="rect">
-            <a:avLst/>
-          </a:prstGeom>
-        </p:spPr>
-      </p:pic>
       <p:sp>
         <p:nvSpPr>
           <p:cNvPr id="100" name="Cube 99"/>
@@ -25484,40 +25532,6 @@
           </a:p>
         </p:txBody>
       </p:sp>
-      <p:pic>
-        <p:nvPicPr>
-          <p:cNvPr id="133" name="Picture 132"/>
-          <p:cNvPicPr>
-            <a:picLocks noChangeAspect="1"/>
-          </p:cNvPicPr>
-          <p:nvPr>
-            <p:custDataLst>
-              <p:tags r:id="rId2"/>
-            </p:custDataLst>
-          </p:nvPr>
-        </p:nvPicPr>
-        <p:blipFill>
-          <a:blip r:embed="rId4" cstate="print">
-            <a:extLst>
-              <a:ext uri="{28A0092B-C50C-407E-A947-70E740481C1C}">
-                <a14:useLocalDpi xmlns:a14="http://schemas.microsoft.com/office/drawing/2010/main" val="0"/>
-              </a:ext>
-            </a:extLst>
-          </a:blip>
-          <a:stretch>
-            <a:fillRect/>
-          </a:stretch>
-        </p:blipFill>
-        <p:spPr>
-          <a:xfrm>
-            <a:off x="3954308" y="3132391"/>
-            <a:ext cx="114300" cy="132588"/>
-          </a:xfrm>
-          <a:prstGeom prst="rect">
-            <a:avLst/>
-          </a:prstGeom>
-        </p:spPr>
-      </p:pic>
       <p:sp>
         <p:nvSpPr>
           <p:cNvPr id="157" name="Cube 156"/>
@@ -26270,6 +26284,78 @@
           </a:p>
         </p:txBody>
       </p:sp>
+      <p:sp>
+        <p:nvSpPr>
+          <p:cNvPr id="24" name="TextBox 23">
+            <a:extLst>
+              <a:ext uri="{FF2B5EF4-FFF2-40B4-BE49-F238E27FC236}">
+                <a16:creationId xmlns:a16="http://schemas.microsoft.com/office/drawing/2014/main" id="{0DA92428-2B00-4C51-8412-902C2047CCBB}"/>
+              </a:ext>
+            </a:extLst>
+          </p:cNvPr>
+          <p:cNvSpPr txBox="1"/>
+          <p:nvPr/>
+        </p:nvSpPr>
+        <p:spPr>
+          <a:xfrm>
+            <a:off x="7852741" y="3061449"/>
+            <a:ext cx="357790" cy="523220"/>
+          </a:xfrm>
+          <a:prstGeom prst="rect">
+            <a:avLst/>
+          </a:prstGeom>
+          <a:noFill/>
+        </p:spPr>
+        <p:txBody>
+          <a:bodyPr wrap="none" rtlCol="0">
+            <a:spAutoFit/>
+          </a:bodyPr>
+          <a:lstStyle/>
+          <a:p>
+            <a:r>
+              <a:rPr lang="en-US" sz="2800" dirty="0"/>
+              <a:t>∗</a:t>
+            </a:r>
+            <a:endParaRPr lang="en" sz="2800" dirty="0"/>
+          </a:p>
+        </p:txBody>
+      </p:sp>
+      <p:sp>
+        <p:nvSpPr>
+          <p:cNvPr id="25" name="TextBox 24">
+            <a:extLst>
+              <a:ext uri="{FF2B5EF4-FFF2-40B4-BE49-F238E27FC236}">
+                <a16:creationId xmlns:a16="http://schemas.microsoft.com/office/drawing/2014/main" id="{1882D88D-3D88-49E1-AD6D-A0BC9F8A96AC}"/>
+              </a:ext>
+            </a:extLst>
+          </p:cNvPr>
+          <p:cNvSpPr txBox="1"/>
+          <p:nvPr/>
+        </p:nvSpPr>
+        <p:spPr>
+          <a:xfrm>
+            <a:off x="3836554" y="2918022"/>
+            <a:ext cx="357790" cy="523220"/>
+          </a:xfrm>
+          <a:prstGeom prst="rect">
+            <a:avLst/>
+          </a:prstGeom>
+          <a:noFill/>
+        </p:spPr>
+        <p:txBody>
+          <a:bodyPr wrap="none" rtlCol="0">
+            <a:spAutoFit/>
+          </a:bodyPr>
+          <a:lstStyle/>
+          <a:p>
+            <a:r>
+              <a:rPr lang="en-US" sz="2800" dirty="0"/>
+              <a:t>∗</a:t>
+            </a:r>
+            <a:endParaRPr lang="en" sz="2800" dirty="0"/>
+          </a:p>
+        </p:txBody>
+      </p:sp>
     </p:spTree>
     <p:extLst>
       <p:ext uri="{BB962C8B-B14F-4D97-AF65-F5344CB8AC3E}">
@@ -26374,40 +26460,6 @@
           </a:p>
         </p:txBody>
       </p:sp>
-      <p:pic>
-        <p:nvPicPr>
-          <p:cNvPr id="133" name="Picture 132"/>
-          <p:cNvPicPr>
-            <a:picLocks noChangeAspect="1"/>
-          </p:cNvPicPr>
-          <p:nvPr>
-            <p:custDataLst>
-              <p:tags r:id="rId1"/>
-            </p:custDataLst>
-          </p:nvPr>
-        </p:nvPicPr>
-        <p:blipFill>
-          <a:blip r:embed="rId3" cstate="print">
-            <a:extLst>
-              <a:ext uri="{28A0092B-C50C-407E-A947-70E740481C1C}">
-                <a14:useLocalDpi xmlns:a14="http://schemas.microsoft.com/office/drawing/2010/main" val="0"/>
-              </a:ext>
-            </a:extLst>
-          </a:blip>
-          <a:stretch>
-            <a:fillRect/>
-          </a:stretch>
-        </p:blipFill>
-        <p:spPr>
-          <a:xfrm>
-            <a:off x="3954308" y="3132391"/>
-            <a:ext cx="114300" cy="132588"/>
-          </a:xfrm>
-          <a:prstGeom prst="rect">
-            <a:avLst/>
-          </a:prstGeom>
-        </p:spPr>
-      </p:pic>
       <p:sp>
         <p:nvSpPr>
           <p:cNvPr id="157" name="Cube 156"/>
@@ -26906,6 +26958,42 @@
           </a:p>
         </p:txBody>
       </p:sp>
+      <p:sp>
+        <p:nvSpPr>
+          <p:cNvPr id="13" name="TextBox 12">
+            <a:extLst>
+              <a:ext uri="{FF2B5EF4-FFF2-40B4-BE49-F238E27FC236}">
+                <a16:creationId xmlns:a16="http://schemas.microsoft.com/office/drawing/2014/main" id="{3C1B17F9-347E-4C21-9D76-57B03074BA1D}"/>
+              </a:ext>
+            </a:extLst>
+          </p:cNvPr>
+          <p:cNvSpPr txBox="1"/>
+          <p:nvPr/>
+        </p:nvSpPr>
+        <p:spPr>
+          <a:xfrm>
+            <a:off x="3836554" y="2918022"/>
+            <a:ext cx="357790" cy="523220"/>
+          </a:xfrm>
+          <a:prstGeom prst="rect">
+            <a:avLst/>
+          </a:prstGeom>
+          <a:noFill/>
+        </p:spPr>
+        <p:txBody>
+          <a:bodyPr wrap="none" rtlCol="0">
+            <a:spAutoFit/>
+          </a:bodyPr>
+          <a:lstStyle/>
+          <a:p>
+            <a:r>
+              <a:rPr lang="en-US" sz="2800" dirty="0"/>
+              <a:t>∗</a:t>
+            </a:r>
+            <a:endParaRPr lang="en" sz="2800" dirty="0"/>
+          </a:p>
+        </p:txBody>
+      </p:sp>
     </p:spTree>
     <p:extLst>
       <p:ext uri="{BB962C8B-B14F-4D97-AF65-F5344CB8AC3E}">
@@ -26920,202 +27008,6 @@
 </file>
 
 <file path=ppt/tags/tag1.xml><?xml version="1.0" encoding="utf-8"?>
-<p:tagLst xmlns:a="http://schemas.openxmlformats.org/drawingml/2006/main" xmlns:r="http://schemas.openxmlformats.org/officeDocument/2006/relationships" xmlns:p="http://schemas.openxmlformats.org/presentationml/2006/main">
-  <p:tag name="LATEXADDIN" val="\documentclass{article}&#10;\usepackage{amsmath,color}&#10;\pagestyle{empty}&#10;\begin{document}&#10;&#10;\definecolor{mc}{rgb}{0.0, 0.0, 0.0}&#10;&#10;\[&#10;\textcolor{mc}{*}&#10;\]&#10;\end{document}"/>
-  <p:tag name="IGUANATEXSIZE" val="24"/>
-</p:tagLst>
-</file>
-
-<file path=ppt/tags/tag10.xml><?xml version="1.0" encoding="utf-8"?>
-<p:tagLst xmlns:a="http://schemas.openxmlformats.org/drawingml/2006/main" xmlns:r="http://schemas.openxmlformats.org/officeDocument/2006/relationships" xmlns:p="http://schemas.openxmlformats.org/presentationml/2006/main">
-  <p:tag name="LATEXADDIN" val="\documentclass{article}&#10;\usepackage{amsmath,color}&#10;\pagestyle{empty}&#10;\begin{document}&#10;&#10;\definecolor{mc}{rgb}{0.0, 0.0, 0.0}&#10;&#10;\[&#10;\textcolor{mc}{*}&#10;\]&#10;\end{document}"/>
-  <p:tag name="IGUANATEXSIZE" val="24"/>
-</p:tagLst>
-</file>
-
-<file path=ppt/tags/tag11.xml><?xml version="1.0" encoding="utf-8"?>
-<p:tagLst xmlns:a="http://schemas.openxmlformats.org/drawingml/2006/main" xmlns:r="http://schemas.openxmlformats.org/officeDocument/2006/relationships" xmlns:p="http://schemas.openxmlformats.org/presentationml/2006/main">
-  <p:tag name="LATEXADDIN" val="\documentclass{article}&#10;\usepackage{amsmath,color}&#10;\pagestyle{empty}&#10;\begin{document}&#10;&#10;\definecolor{mc}{rgb}{0.0, 0.0, 0.0}&#10;&#10;\[&#10;\textcolor{mc}{*}&#10;\]&#10;\end{document}"/>
-  <p:tag name="IGUANATEXSIZE" val="24"/>
-</p:tagLst>
-</file>
-
-<file path=ppt/tags/tag12.xml><?xml version="1.0" encoding="utf-8"?>
-<p:tagLst xmlns:a="http://schemas.openxmlformats.org/drawingml/2006/main" xmlns:r="http://schemas.openxmlformats.org/officeDocument/2006/relationships" xmlns:p="http://schemas.openxmlformats.org/presentationml/2006/main">
-  <p:tag name="LATEXADDIN" val="\documentclass{article}&#10;\usepackage{amsmath,color}&#10;\pagestyle{empty}&#10;\begin{document}&#10;&#10;\definecolor{mc}{rgb}{0.0, 0.0, 0.0}&#10;&#10;\[&#10;\textcolor{mc}{*}&#10;\]&#10;\end{document}"/>
-  <p:tag name="IGUANATEXSIZE" val="24"/>
-</p:tagLst>
-</file>
-
-<file path=ppt/tags/tag13.xml><?xml version="1.0" encoding="utf-8"?>
-<p:tagLst xmlns:a="http://schemas.openxmlformats.org/drawingml/2006/main" xmlns:r="http://schemas.openxmlformats.org/officeDocument/2006/relationships" xmlns:p="http://schemas.openxmlformats.org/presentationml/2006/main">
-  <p:tag name="LATEXADDIN" val="\documentclass{article}&#10;\usepackage{amsmath,color}&#10;\pagestyle{empty}&#10;\begin{document}&#10;&#10;\definecolor{mc}{rgb}{0.0, 0.0, 0.0}&#10;&#10;\[&#10;\textcolor{mc}{*}&#10;\]&#10;\end{document}"/>
-  <p:tag name="IGUANATEXSIZE" val="24"/>
-</p:tagLst>
-</file>
-
-<file path=ppt/tags/tag14.xml><?xml version="1.0" encoding="utf-8"?>
-<p:tagLst xmlns:a="http://schemas.openxmlformats.org/drawingml/2006/main" xmlns:r="http://schemas.openxmlformats.org/officeDocument/2006/relationships" xmlns:p="http://schemas.openxmlformats.org/presentationml/2006/main">
-  <p:tag name="LATEXADDIN" val="\documentclass{article}&#10;\usepackage{amsmath,color}&#10;\pagestyle{empty}&#10;\begin{document}&#10;&#10;\definecolor{mc}{rgb}{0.0, 0.0, 0.0}&#10;&#10;\[&#10;\textcolor{mc}{*}&#10;\]&#10;\end{document}"/>
-  <p:tag name="IGUANATEXSIZE" val="24"/>
-</p:tagLst>
-</file>
-
-<file path=ppt/tags/tag15.xml><?xml version="1.0" encoding="utf-8"?>
-<p:tagLst xmlns:a="http://schemas.openxmlformats.org/drawingml/2006/main" xmlns:r="http://schemas.openxmlformats.org/officeDocument/2006/relationships" xmlns:p="http://schemas.openxmlformats.org/presentationml/2006/main">
-  <p:tag name="LATEXADDIN" val="\documentclass{article}&#10;\usepackage{amsmath,color}&#10;\pagestyle{empty}&#10;\begin{document}&#10;&#10;\definecolor{mc}{rgb}{0.0, 0.0, 0.0}&#10;&#10;\[&#10;\textcolor{mc}{*}&#10;\]&#10;\end{document}"/>
-  <p:tag name="IGUANATEXSIZE" val="24"/>
-</p:tagLst>
-</file>
-
-<file path=ppt/tags/tag16.xml><?xml version="1.0" encoding="utf-8"?>
-<p:tagLst xmlns:a="http://schemas.openxmlformats.org/drawingml/2006/main" xmlns:r="http://schemas.openxmlformats.org/officeDocument/2006/relationships" xmlns:p="http://schemas.openxmlformats.org/presentationml/2006/main">
-  <p:tag name="LATEXADDIN" val="\documentclass{article}&#10;\usepackage{amsmath,color}&#10;\pagestyle{empty}&#10;\begin{document}&#10;&#10;\definecolor{mc}{rgb}{0.0, 0.0, 0.0}&#10;&#10;\[&#10;\textcolor{mc}{*}&#10;\]&#10;\end{document}"/>
-  <p:tag name="IGUANATEXSIZE" val="24"/>
-</p:tagLst>
-</file>
-
-<file path=ppt/tags/tag17.xml><?xml version="1.0" encoding="utf-8"?>
-<p:tagLst xmlns:a="http://schemas.openxmlformats.org/drawingml/2006/main" xmlns:r="http://schemas.openxmlformats.org/officeDocument/2006/relationships" xmlns:p="http://schemas.openxmlformats.org/presentationml/2006/main">
-  <p:tag name="LATEXADDIN" val="\documentclass{article}&#10;\usepackage{amsmath,color}&#10;\pagestyle{empty}&#10;\begin{document}&#10;&#10;\definecolor{mc}{rgb}{0.0, 0.0, 0.0}&#10;&#10;\[&#10;\textcolor{mc}{*}&#10;\]&#10;\end{document}"/>
-  <p:tag name="IGUANATEXSIZE" val="24"/>
-</p:tagLst>
-</file>
-
-<file path=ppt/tags/tag18.xml><?xml version="1.0" encoding="utf-8"?>
-<p:tagLst xmlns:a="http://schemas.openxmlformats.org/drawingml/2006/main" xmlns:r="http://schemas.openxmlformats.org/officeDocument/2006/relationships" xmlns:p="http://schemas.openxmlformats.org/presentationml/2006/main">
-  <p:tag name="LATEXADDIN" val="\documentclass{article}&#10;\usepackage{amsmath,color}&#10;\pagestyle{empty}&#10;\begin{document}&#10;&#10;\definecolor{mc}{rgb}{0.0, 0.0, 0.0}&#10;&#10;\[&#10;\textcolor{mc}{*}&#10;\]&#10;\end{document}"/>
-  <p:tag name="IGUANATEXSIZE" val="24"/>
-</p:tagLst>
-</file>
-
-<file path=ppt/tags/tag19.xml><?xml version="1.0" encoding="utf-8"?>
-<p:tagLst xmlns:a="http://schemas.openxmlformats.org/drawingml/2006/main" xmlns:r="http://schemas.openxmlformats.org/officeDocument/2006/relationships" xmlns:p="http://schemas.openxmlformats.org/presentationml/2006/main">
-  <p:tag name="LATEXADDIN" val="\documentclass{article}&#10;\usepackage{amsmath,color}&#10;\pagestyle{empty}&#10;\begin{document}&#10;&#10;\definecolor{mc}{rgb}{0.0, 0.0, 0.0}&#10;&#10;\[&#10;\textcolor{mc}{*}&#10;\]&#10;\end{document}"/>
-  <p:tag name="IGUANATEXSIZE" val="24"/>
-</p:tagLst>
-</file>
-
-<file path=ppt/tags/tag2.xml><?xml version="1.0" encoding="utf-8"?>
-<p:tagLst xmlns:a="http://schemas.openxmlformats.org/drawingml/2006/main" xmlns:r="http://schemas.openxmlformats.org/officeDocument/2006/relationships" xmlns:p="http://schemas.openxmlformats.org/presentationml/2006/main">
-  <p:tag name="LATEXADDIN" val="\documentclass{article}&#10;\usepackage{amsmath,color}&#10;\pagestyle{empty}&#10;\begin{document}&#10;&#10;\definecolor{mc}{rgb}{0.0, 0.0, 0.0}&#10;&#10;\[&#10;\textcolor{mc}{*}&#10;\]&#10;\end{document}"/>
-  <p:tag name="IGUANATEXSIZE" val="24"/>
-</p:tagLst>
-</file>
-
-<file path=ppt/tags/tag20.xml><?xml version="1.0" encoding="utf-8"?>
-<p:tagLst xmlns:a="http://schemas.openxmlformats.org/drawingml/2006/main" xmlns:r="http://schemas.openxmlformats.org/officeDocument/2006/relationships" xmlns:p="http://schemas.openxmlformats.org/presentationml/2006/main">
-  <p:tag name="LATEXADDIN" val="\documentclass{article}&#10;\usepackage{amsmath,color}&#10;\pagestyle{empty}&#10;\begin{document}&#10;&#10;\definecolor{mc}{rgb}{0.0, 0.0, 0.0}&#10;&#10;\[&#10;\textcolor{mc}{*}&#10;\]&#10;\end{document}"/>
-  <p:tag name="IGUANATEXSIZE" val="24"/>
-</p:tagLst>
-</file>
-
-<file path=ppt/tags/tag21.xml><?xml version="1.0" encoding="utf-8"?>
-<p:tagLst xmlns:a="http://schemas.openxmlformats.org/drawingml/2006/main" xmlns:r="http://schemas.openxmlformats.org/officeDocument/2006/relationships" xmlns:p="http://schemas.openxmlformats.org/presentationml/2006/main">
-  <p:tag name="LATEXADDIN" val="\documentclass{article}&#10;\usepackage{amsmath,color}&#10;\pagestyle{empty}&#10;\begin{document}&#10;&#10;\definecolor{mc}{rgb}{0.0, 0.0, 0.0}&#10;&#10;\[&#10;\textcolor{mc}{*}&#10;\]&#10;\end{document}"/>
-  <p:tag name="IGUANATEXSIZE" val="24"/>
-</p:tagLst>
-</file>
-
-<file path=ppt/tags/tag22.xml><?xml version="1.0" encoding="utf-8"?>
-<p:tagLst xmlns:a="http://schemas.openxmlformats.org/drawingml/2006/main" xmlns:r="http://schemas.openxmlformats.org/officeDocument/2006/relationships" xmlns:p="http://schemas.openxmlformats.org/presentationml/2006/main">
-  <p:tag name="LATEXADDIN" val="\documentclass{article}&#10;\usepackage{amsmath,color}&#10;\pagestyle{empty}&#10;\begin{document}&#10;&#10;\definecolor{mc}{rgb}{0.0, 0.0, 0.0}&#10;&#10;\[&#10;\textcolor{mc}{*}&#10;\]&#10;\end{document}"/>
-  <p:tag name="IGUANATEXSIZE" val="24"/>
-</p:tagLst>
-</file>
-
-<file path=ppt/tags/tag23.xml><?xml version="1.0" encoding="utf-8"?>
-<p:tagLst xmlns:a="http://schemas.openxmlformats.org/drawingml/2006/main" xmlns:r="http://schemas.openxmlformats.org/officeDocument/2006/relationships" xmlns:p="http://schemas.openxmlformats.org/presentationml/2006/main">
-  <p:tag name="LATEXADDIN" val="\documentclass{article}&#10;\usepackage{amsmath,color}&#10;\pagestyle{empty}&#10;\begin{document}&#10;&#10;\definecolor{mc}{rgb}{0.0, 0.0, 0.0}&#10;&#10;\[&#10;\textcolor{mc}{*}&#10;\]&#10;\end{document}"/>
-  <p:tag name="IGUANATEXSIZE" val="24"/>
-</p:tagLst>
-</file>
-
-<file path=ppt/tags/tag24.xml><?xml version="1.0" encoding="utf-8"?>
-<p:tagLst xmlns:a="http://schemas.openxmlformats.org/drawingml/2006/main" xmlns:r="http://schemas.openxmlformats.org/officeDocument/2006/relationships" xmlns:p="http://schemas.openxmlformats.org/presentationml/2006/main">
-  <p:tag name="LATEXADDIN" val="\documentclass{article}&#10;\usepackage{amsmath,color}&#10;\pagestyle{empty}&#10;\begin{document}&#10;&#10;\definecolor{mc}{rgb}{0.0, 0.0, 0.0}&#10;&#10;\[&#10;\textcolor{mc}{*}&#10;\]&#10;\end{document}"/>
-  <p:tag name="IGUANATEXSIZE" val="24"/>
-</p:tagLst>
-</file>
-
-<file path=ppt/tags/tag25.xml><?xml version="1.0" encoding="utf-8"?>
-<p:tagLst xmlns:a="http://schemas.openxmlformats.org/drawingml/2006/main" xmlns:r="http://schemas.openxmlformats.org/officeDocument/2006/relationships" xmlns:p="http://schemas.openxmlformats.org/presentationml/2006/main">
-  <p:tag name="LATEXADDIN" val="\documentclass{article}&#10;\usepackage{amsmath,color}&#10;\pagestyle{empty}&#10;\begin{document}&#10;&#10;\definecolor{mc}{rgb}{0.0, 0.0, 0.0}&#10;&#10;\[&#10;\textcolor{mc}{*}&#10;\]&#10;\end{document}"/>
-  <p:tag name="IGUANATEXSIZE" val="24"/>
-</p:tagLst>
-</file>
-
-<file path=ppt/tags/tag26.xml><?xml version="1.0" encoding="utf-8"?>
-<p:tagLst xmlns:a="http://schemas.openxmlformats.org/drawingml/2006/main" xmlns:r="http://schemas.openxmlformats.org/officeDocument/2006/relationships" xmlns:p="http://schemas.openxmlformats.org/presentationml/2006/main">
-  <p:tag name="LATEXADDIN" val="\documentclass{article}&#10;\usepackage{amsmath,color}&#10;\pagestyle{empty}&#10;\begin{document}&#10;&#10;\definecolor{mc}{rgb}{0.0, 0.0, 0.0}&#10;&#10;\[&#10;\textcolor{mc}{*}&#10;\]&#10;\end{document}"/>
-  <p:tag name="IGUANATEXSIZE" val="24"/>
-</p:tagLst>
-</file>
-
-<file path=ppt/tags/tag27.xml><?xml version="1.0" encoding="utf-8"?>
-<p:tagLst xmlns:a="http://schemas.openxmlformats.org/drawingml/2006/main" xmlns:r="http://schemas.openxmlformats.org/officeDocument/2006/relationships" xmlns:p="http://schemas.openxmlformats.org/presentationml/2006/main">
-  <p:tag name="LATEXADDIN" val="\documentclass{article}&#10;\usepackage{amsmath,color}&#10;\pagestyle{empty}&#10;\begin{document}&#10;&#10;\definecolor{mc}{rgb}{0.0, 0.0, 0.0}&#10;&#10;\[&#10;\textcolor{mc}{*}&#10;\]&#10;\end{document}"/>
-  <p:tag name="IGUANATEXSIZE" val="24"/>
-</p:tagLst>
-</file>
-
-<file path=ppt/tags/tag28.xml><?xml version="1.0" encoding="utf-8"?>
-<p:tagLst xmlns:a="http://schemas.openxmlformats.org/drawingml/2006/main" xmlns:r="http://schemas.openxmlformats.org/officeDocument/2006/relationships" xmlns:p="http://schemas.openxmlformats.org/presentationml/2006/main">
-  <p:tag name="LATEXADDIN" val="\documentclass{article}&#10;\usepackage{amsmath,color}&#10;\pagestyle{empty}&#10;\begin{document}&#10;&#10;\definecolor{mc}{rgb}{0.0, 0.0, 0.0}&#10;&#10;\[&#10;\textcolor{mc}{*}&#10;\]&#10;\end{document}"/>
-  <p:tag name="IGUANATEXSIZE" val="24"/>
-</p:tagLst>
-</file>
-
-<file path=ppt/tags/tag29.xml><?xml version="1.0" encoding="utf-8"?>
-<p:tagLst xmlns:a="http://schemas.openxmlformats.org/drawingml/2006/main" xmlns:r="http://schemas.openxmlformats.org/officeDocument/2006/relationships" xmlns:p="http://schemas.openxmlformats.org/presentationml/2006/main">
-  <p:tag name="LATEXADDIN" val="\documentclass{article}&#10;\usepackage{amsmath,color}&#10;\pagestyle{empty}&#10;\begin{document}&#10;&#10;\definecolor{mc}{rgb}{0.0, 0.0, 0.0}&#10;&#10;\[&#10;\textcolor{mc}{*}&#10;\]&#10;\end{document}"/>
-  <p:tag name="IGUANATEXSIZE" val="24"/>
-</p:tagLst>
-</file>
-
-<file path=ppt/tags/tag3.xml><?xml version="1.0" encoding="utf-8"?>
-<p:tagLst xmlns:a="http://schemas.openxmlformats.org/drawingml/2006/main" xmlns:r="http://schemas.openxmlformats.org/officeDocument/2006/relationships" xmlns:p="http://schemas.openxmlformats.org/presentationml/2006/main">
-  <p:tag name="LATEXADDIN" val="\documentclass{article}&#10;\usepackage{amsmath,color}&#10;\pagestyle{empty}&#10;\begin{document}&#10;&#10;\definecolor{mc}{rgb}{0.0, 0.0, 0.0}&#10;&#10;\[&#10;\textcolor{mc}{*}&#10;\]&#10;\end{document}"/>
-  <p:tag name="IGUANATEXSIZE" val="24"/>
-</p:tagLst>
-</file>
-
-<file path=ppt/tags/tag4.xml><?xml version="1.0" encoding="utf-8"?>
-<p:tagLst xmlns:a="http://schemas.openxmlformats.org/drawingml/2006/main" xmlns:r="http://schemas.openxmlformats.org/officeDocument/2006/relationships" xmlns:p="http://schemas.openxmlformats.org/presentationml/2006/main">
-  <p:tag name="LATEXADDIN" val="\documentclass{article}&#10;\usepackage{amsmath,color}&#10;\pagestyle{empty}&#10;\begin{document}&#10;&#10;\definecolor{mc}{rgb}{0.0, 0.0, 0.0}&#10;&#10;\[&#10;\textcolor{mc}{*}&#10;\]&#10;\end{document}"/>
-  <p:tag name="IGUANATEXSIZE" val="24"/>
-</p:tagLst>
-</file>
-
-<file path=ppt/tags/tag5.xml><?xml version="1.0" encoding="utf-8"?>
-<p:tagLst xmlns:a="http://schemas.openxmlformats.org/drawingml/2006/main" xmlns:r="http://schemas.openxmlformats.org/officeDocument/2006/relationships" xmlns:p="http://schemas.openxmlformats.org/presentationml/2006/main">
-  <p:tag name="LATEXADDIN" val="\documentclass{article}&#10;\usepackage{amsmath,color}&#10;\pagestyle{empty}&#10;\begin{document}&#10;&#10;\definecolor{mc}{rgb}{0.0, 0.0, 0.0}&#10;&#10;\[&#10;\textcolor{mc}{*}&#10;\]&#10;\end{document}"/>
-  <p:tag name="IGUANATEXSIZE" val="24"/>
-</p:tagLst>
-</file>
-
-<file path=ppt/tags/tag6.xml><?xml version="1.0" encoding="utf-8"?>
-<p:tagLst xmlns:a="http://schemas.openxmlformats.org/drawingml/2006/main" xmlns:r="http://schemas.openxmlformats.org/officeDocument/2006/relationships" xmlns:p="http://schemas.openxmlformats.org/presentationml/2006/main">
-  <p:tag name="LATEXADDIN" val="\documentclass{article}&#10;\usepackage{amsmath,color}&#10;\pagestyle{empty}&#10;\begin{document}&#10;&#10;\definecolor{mc}{rgb}{0.0, 0.0, 0.0}&#10;&#10;\[&#10;\textcolor{mc}{*}&#10;\]&#10;\end{document}"/>
-  <p:tag name="IGUANATEXSIZE" val="24"/>
-</p:tagLst>
-</file>
-
-<file path=ppt/tags/tag7.xml><?xml version="1.0" encoding="utf-8"?>
-<p:tagLst xmlns:a="http://schemas.openxmlformats.org/drawingml/2006/main" xmlns:r="http://schemas.openxmlformats.org/officeDocument/2006/relationships" xmlns:p="http://schemas.openxmlformats.org/presentationml/2006/main">
-  <p:tag name="LATEXADDIN" val="\documentclass{article}&#10;\usepackage{amsmath,color}&#10;\pagestyle{empty}&#10;\begin{document}&#10;&#10;\definecolor{mc}{rgb}{0.0, 0.0, 0.0}&#10;&#10;\[&#10;\textcolor{mc}{*}&#10;\]&#10;\end{document}"/>
-  <p:tag name="IGUANATEXSIZE" val="24"/>
-</p:tagLst>
-</file>
-
-<file path=ppt/tags/tag8.xml><?xml version="1.0" encoding="utf-8"?>
-<p:tagLst xmlns:a="http://schemas.openxmlformats.org/drawingml/2006/main" xmlns:r="http://schemas.openxmlformats.org/officeDocument/2006/relationships" xmlns:p="http://schemas.openxmlformats.org/presentationml/2006/main">
-  <p:tag name="LATEXADDIN" val="\documentclass{article}&#10;\usepackage{amsmath,color}&#10;\pagestyle{empty}&#10;\begin{document}&#10;&#10;\definecolor{mc}{rgb}{0.0, 0.0, 0.0}&#10;&#10;\[&#10;\textcolor{mc}{*}&#10;\]&#10;\end{document}"/>
-  <p:tag name="IGUANATEXSIZE" val="24"/>
-</p:tagLst>
-</file>
-
-<file path=ppt/tags/tag9.xml><?xml version="1.0" encoding="utf-8"?>
 <p:tagLst xmlns:a="http://schemas.openxmlformats.org/drawingml/2006/main" xmlns:r="http://schemas.openxmlformats.org/officeDocument/2006/relationships" xmlns:p="http://schemas.openxmlformats.org/presentationml/2006/main">
   <p:tag name="LATEXADDIN" val="\documentclass{article}&#10;\usepackage{amsmath,color}&#10;\pagestyle{empty}&#10;\begin{document}&#10;&#10;\definecolor{mc}{rgb}{0.0, 0.0, 0.0}&#10;&#10;\[&#10;\textcolor{mc}{*}&#10;\]&#10;\end{document}"/>
   <p:tag name="IGUANATEXSIZE" val="24"/>

</xml_diff>

<commit_message>
Fix up one groupfig subfig without new convolution symbol
</commit_message>
<xml_diff>
--- a/Figs/Vector/groupfig.pptx
+++ b/Figs/Vector/groupfig.pptx
@@ -35,24 +35,24 @@
   <p:notesSz cx="6858000" cy="9144000"/>
   <p:embeddedFontLst>
     <p:embeddedFont>
-      <p:font typeface="cmss12" panose="020B0500000000000000" pitchFamily="34" charset="0"/>
+      <p:font typeface="Cambria Math" panose="02040503050406030204" pitchFamily="18" charset="0"/>
       <p:regular r:id="rId25"/>
     </p:embeddedFont>
     <p:embeddedFont>
+      <p:font typeface="cmss12" panose="020B0500000000000000" pitchFamily="34" charset="0"/>
+      <p:regular r:id="rId26"/>
+    </p:embeddedFont>
+    <p:embeddedFont>
       <p:font typeface="Calibri Light" panose="020F0302020204030204" pitchFamily="34" charset="0"/>
-      <p:regular r:id="rId26"/>
-      <p:italic r:id="rId27"/>
+      <p:regular r:id="rId27"/>
+      <p:italic r:id="rId28"/>
     </p:embeddedFont>
     <p:embeddedFont>
       <p:font typeface="Calibri" panose="020F0502020204030204" pitchFamily="34" charset="0"/>
-      <p:regular r:id="rId28"/>
-      <p:bold r:id="rId29"/>
-      <p:italic r:id="rId30"/>
-      <p:boldItalic r:id="rId31"/>
-    </p:embeddedFont>
-    <p:embeddedFont>
-      <p:font typeface="Cambria Math" panose="02040503050406030204" pitchFamily="18" charset="0"/>
-      <p:regular r:id="rId32"/>
+      <p:regular r:id="rId29"/>
+      <p:bold r:id="rId30"/>
+      <p:italic r:id="rId31"/>
+      <p:boldItalic r:id="rId32"/>
     </p:embeddedFont>
   </p:embeddedFontLst>
   <p:defaultTextStyle>
@@ -214,6 +214,82 @@
 </p:presentation>
 </file>
 
+<file path=ppt/changesInfos/changesInfo1.xml><?xml version="1.0" encoding="utf-8"?>
+<pc:chgInfo xmlns:a="http://schemas.openxmlformats.org/drawingml/2006/main" xmlns:r="http://schemas.openxmlformats.org/officeDocument/2006/relationships" xmlns:ac="http://schemas.microsoft.com/office/drawing/2013/main/command" xmlns:pc="http://schemas.microsoft.com/office/powerpoint/2013/main/command">
+  <pc:docChgLst>
+    <pc:chgData name="Yani Ioannou" userId="e42299b91de3287c" providerId="LiveId" clId="{0CEAF73A-9D5E-4132-9297-209C67B6FB1C}"/>
+    <pc:docChg chg="modSld">
+      <pc:chgData name="Yani Ioannou" userId="e42299b91de3287c" providerId="LiveId" clId="{0CEAF73A-9D5E-4132-9297-209C67B6FB1C}" dt="2017-10-02T19:04:00.716" v="1"/>
+      <pc:docMkLst>
+        <pc:docMk/>
+      </pc:docMkLst>
+      <pc:sldChg chg="modSp">
+        <pc:chgData name="Yani Ioannou" userId="e42299b91de3287c" providerId="LiveId" clId="{0CEAF73A-9D5E-4132-9297-209C67B6FB1C}" dt="2017-10-02T19:04:00.716" v="1"/>
+        <pc:sldMkLst>
+          <pc:docMk/>
+          <pc:sldMk cId="561950903" sldId="606"/>
+        </pc:sldMkLst>
+        <pc:spChg chg="mod">
+          <ac:chgData name="Yani Ioannou" userId="e42299b91de3287c" providerId="LiveId" clId="{0CEAF73A-9D5E-4132-9297-209C67B6FB1C}" dt="2017-10-02T19:04:00.716" v="1"/>
+          <ac:spMkLst>
+            <pc:docMk/>
+            <pc:sldMk cId="561950903" sldId="606"/>
+            <ac:spMk id="32" creationId="{00000000-0000-0000-0000-000000000000}"/>
+          </ac:spMkLst>
+        </pc:spChg>
+      </pc:sldChg>
+    </pc:docChg>
+  </pc:docChgLst>
+  <pc:docChgLst>
+    <pc:chgData name="Yani Ioannou" userId="e42299b91de3287c" providerId="LiveId" clId="{0E02FD17-2581-4794-AF9B-11FC289E0727}"/>
+    <pc:docChg chg="custSel modSld">
+      <pc:chgData name="Yani Ioannou" userId="e42299b91de3287c" providerId="LiveId" clId="{0E02FD17-2581-4794-AF9B-11FC289E0727}" dt="2017-10-09T16:09:14.017" v="93" actId="478"/>
+      <pc:docMkLst>
+        <pc:docMk/>
+      </pc:docMkLst>
+      <pc:sldChg chg="modSp">
+        <pc:chgData name="Yani Ioannou" userId="e42299b91de3287c" providerId="LiveId" clId="{0E02FD17-2581-4794-AF9B-11FC289E0727}" dt="2017-10-09T16:08:38.084" v="0" actId="1036"/>
+        <pc:sldMkLst>
+          <pc:docMk/>
+          <pc:sldMk cId="1485847398" sldId="633"/>
+        </pc:sldMkLst>
+        <pc:spChg chg="mod">
+          <ac:chgData name="Yani Ioannou" userId="e42299b91de3287c" providerId="LiveId" clId="{0E02FD17-2581-4794-AF9B-11FC289E0727}" dt="2017-10-09T16:08:38.084" v="0" actId="1036"/>
+          <ac:spMkLst>
+            <pc:docMk/>
+            <pc:sldMk cId="1485847398" sldId="633"/>
+            <ac:spMk id="9" creationId="{E01576B7-B350-4623-90EF-7C85B06B176B}"/>
+          </ac:spMkLst>
+        </pc:spChg>
+      </pc:sldChg>
+      <pc:sldChg chg="addSp delSp modSp">
+        <pc:chgData name="Yani Ioannou" userId="e42299b91de3287c" providerId="LiveId" clId="{0E02FD17-2581-4794-AF9B-11FC289E0727}" dt="2017-10-09T16:09:14.017" v="93" actId="478"/>
+        <pc:sldMkLst>
+          <pc:docMk/>
+          <pc:sldMk cId="1297846077" sldId="634"/>
+        </pc:sldMkLst>
+        <pc:spChg chg="add mod ord">
+          <ac:chgData name="Yani Ioannou" userId="e42299b91de3287c" providerId="LiveId" clId="{0E02FD17-2581-4794-AF9B-11FC289E0727}" dt="2017-10-09T16:09:10.436" v="92" actId="167"/>
+          <ac:spMkLst>
+            <pc:docMk/>
+            <pc:sldMk cId="1297846077" sldId="634"/>
+            <ac:spMk id="11" creationId="{1C72E3B4-6671-4AEC-8D06-D50DB584AB81}"/>
+          </ac:spMkLst>
+        </pc:spChg>
+        <pc:picChg chg="del">
+          <ac:chgData name="Yani Ioannou" userId="e42299b91de3287c" providerId="LiveId" clId="{0E02FD17-2581-4794-AF9B-11FC289E0727}" dt="2017-10-09T16:09:14.017" v="93" actId="478"/>
+          <ac:picMkLst>
+            <pc:docMk/>
+            <pc:sldMk cId="1297846077" sldId="634"/>
+            <ac:picMk id="98" creationId="{00000000-0000-0000-0000-000000000000}"/>
+          </ac:picMkLst>
+        </pc:picChg>
+      </pc:sldChg>
+    </pc:docChg>
+  </pc:docChgLst>
+</pc:chgInfo>
+</file>
+
 <file path=ppt/notesMasters/notesMaster1.xml><?xml version="1.0" encoding="utf-8"?>
 <p:notesMaster xmlns:a="http://schemas.openxmlformats.org/drawingml/2006/main" xmlns:r="http://schemas.openxmlformats.org/officeDocument/2006/relationships" xmlns:p="http://schemas.openxmlformats.org/presentationml/2006/main">
   <p:cSld>
@@ -296,7 +372,7 @@
           <a:p>
             <a:fld id="{55F84DDE-8DD5-4235-9C2C-576BEFBBE3A5}" type="datetimeFigureOut">
               <a:rPr lang="en-GB" smtClean="0"/>
-              <a:t>28/09/2017</a:t>
+              <a:t>09/10/2017</a:t>
             </a:fld>
             <a:endParaRPr lang="en-GB" dirty="0"/>
           </a:p>
@@ -695,7 +771,7 @@
           <a:p>
             <a:fld id="{EB30E7E4-13DE-445B-9218-4E7CBAC44123}" type="datetimeFigureOut">
               <a:rPr lang="en-GB" smtClean="0"/>
-              <a:t>28/09/2017</a:t>
+              <a:t>09/10/2017</a:t>
             </a:fld>
             <a:endParaRPr lang="en-GB" dirty="0"/>
           </a:p>
@@ -865,7 +941,7 @@
           <a:p>
             <a:fld id="{EB30E7E4-13DE-445B-9218-4E7CBAC44123}" type="datetimeFigureOut">
               <a:rPr lang="en-GB" smtClean="0"/>
-              <a:t>28/09/2017</a:t>
+              <a:t>09/10/2017</a:t>
             </a:fld>
             <a:endParaRPr lang="en-GB" dirty="0"/>
           </a:p>
@@ -1045,7 +1121,7 @@
           <a:p>
             <a:fld id="{EB30E7E4-13DE-445B-9218-4E7CBAC44123}" type="datetimeFigureOut">
               <a:rPr lang="en-GB" smtClean="0"/>
-              <a:t>28/09/2017</a:t>
+              <a:t>09/10/2017</a:t>
             </a:fld>
             <a:endParaRPr lang="en-GB" dirty="0"/>
           </a:p>
@@ -1215,7 +1291,7 @@
           <a:p>
             <a:fld id="{EB30E7E4-13DE-445B-9218-4E7CBAC44123}" type="datetimeFigureOut">
               <a:rPr lang="en-GB" smtClean="0"/>
-              <a:t>28/09/2017</a:t>
+              <a:t>09/10/2017</a:t>
             </a:fld>
             <a:endParaRPr lang="en-GB" dirty="0"/>
           </a:p>
@@ -1461,7 +1537,7 @@
           <a:p>
             <a:fld id="{EB30E7E4-13DE-445B-9218-4E7CBAC44123}" type="datetimeFigureOut">
               <a:rPr lang="en-GB" smtClean="0"/>
-              <a:t>28/09/2017</a:t>
+              <a:t>09/10/2017</a:t>
             </a:fld>
             <a:endParaRPr lang="en-GB" dirty="0"/>
           </a:p>
@@ -1693,7 +1769,7 @@
           <a:p>
             <a:fld id="{EB30E7E4-13DE-445B-9218-4E7CBAC44123}" type="datetimeFigureOut">
               <a:rPr lang="en-GB" smtClean="0"/>
-              <a:t>28/09/2017</a:t>
+              <a:t>09/10/2017</a:t>
             </a:fld>
             <a:endParaRPr lang="en-GB" dirty="0"/>
           </a:p>
@@ -2060,7 +2136,7 @@
           <a:p>
             <a:fld id="{EB30E7E4-13DE-445B-9218-4E7CBAC44123}" type="datetimeFigureOut">
               <a:rPr lang="en-GB" smtClean="0"/>
-              <a:t>28/09/2017</a:t>
+              <a:t>09/10/2017</a:t>
             </a:fld>
             <a:endParaRPr lang="en-GB" dirty="0"/>
           </a:p>
@@ -2178,7 +2254,7 @@
           <a:p>
             <a:fld id="{EB30E7E4-13DE-445B-9218-4E7CBAC44123}" type="datetimeFigureOut">
               <a:rPr lang="en-GB" smtClean="0"/>
-              <a:t>28/09/2017</a:t>
+              <a:t>09/10/2017</a:t>
             </a:fld>
             <a:endParaRPr lang="en-GB" dirty="0"/>
           </a:p>
@@ -2273,7 +2349,7 @@
           <a:p>
             <a:fld id="{EB30E7E4-13DE-445B-9218-4E7CBAC44123}" type="datetimeFigureOut">
               <a:rPr lang="en-GB" smtClean="0"/>
-              <a:t>28/09/2017</a:t>
+              <a:t>09/10/2017</a:t>
             </a:fld>
             <a:endParaRPr lang="en-GB" dirty="0"/>
           </a:p>
@@ -2550,7 +2626,7 @@
           <a:p>
             <a:fld id="{EB30E7E4-13DE-445B-9218-4E7CBAC44123}" type="datetimeFigureOut">
               <a:rPr lang="en-GB" smtClean="0"/>
-              <a:t>28/09/2017</a:t>
+              <a:t>09/10/2017</a:t>
             </a:fld>
             <a:endParaRPr lang="en-GB" dirty="0"/>
           </a:p>
@@ -2803,7 +2879,7 @@
           <a:p>
             <a:fld id="{EB30E7E4-13DE-445B-9218-4E7CBAC44123}" type="datetimeFigureOut">
               <a:rPr lang="en-GB" smtClean="0"/>
-              <a:t>28/09/2017</a:t>
+              <a:t>09/10/2017</a:t>
             </a:fld>
             <a:endParaRPr lang="en-GB" dirty="0"/>
           </a:p>
@@ -3016,7 +3092,7 @@
           <a:p>
             <a:fld id="{EB30E7E4-13DE-445B-9218-4E7CBAC44123}" type="datetimeFigureOut">
               <a:rPr lang="en-GB" smtClean="0"/>
-              <a:t>28/09/2017</a:t>
+              <a:t>09/10/2017</a:t>
             </a:fld>
             <a:endParaRPr lang="en-GB" dirty="0"/>
           </a:p>
@@ -3762,10 +3838,7 @@
             </a:avLst>
           </a:prstGeom>
           <a:solidFill>
-            <a:schemeClr val="accent4">
-              <a:lumMod val="40000"/>
-              <a:lumOff val="60000"/>
-            </a:schemeClr>
+            <a:srgbClr val="FFE699"/>
           </a:solidFill>
           <a:ln>
             <a:solidFill>
@@ -10170,7 +10243,7 @@
         </p:nvSpPr>
         <p:spPr>
           <a:xfrm>
-            <a:off x="3938140" y="2971805"/>
+            <a:off x="3938140" y="2977184"/>
             <a:ext cx="357790" cy="523220"/>
           </a:xfrm>
           <a:prstGeom prst="rect">
@@ -10571,40 +10644,46 @@
           <a:chExt cx="0" cy="0"/>
         </a:xfrm>
       </p:grpSpPr>
-      <p:pic>
-        <p:nvPicPr>
-          <p:cNvPr id="98" name="Picture 97"/>
-          <p:cNvPicPr>
-            <a:picLocks noChangeAspect="1"/>
-          </p:cNvPicPr>
-          <p:nvPr>
-            <p:custDataLst>
-              <p:tags r:id="rId1"/>
-            </p:custDataLst>
-          </p:nvPr>
-        </p:nvPicPr>
-        <p:blipFill>
-          <a:blip r:embed="rId3" cstate="print">
+      <p:sp>
+        <p:nvSpPr>
+          <p:cNvPr id="11" name="TextBox 10">
             <a:extLst>
-              <a:ext uri="{28A0092B-C50C-407E-A947-70E740481C1C}">
-                <a14:useLocalDpi xmlns:a14="http://schemas.microsoft.com/office/drawing/2010/main" val="0"/>
+              <a:ext uri="{FF2B5EF4-FFF2-40B4-BE49-F238E27FC236}">
+                <a16:creationId xmlns:a16="http://schemas.microsoft.com/office/drawing/2014/main" id="{1C72E3B4-6671-4AEC-8D06-D50DB584AB81}"/>
               </a:ext>
             </a:extLst>
-          </a:blip>
-          <a:stretch>
-            <a:fillRect/>
-          </a:stretch>
-        </p:blipFill>
-        <p:spPr>
-          <a:xfrm>
-            <a:off x="8024284" y="3189108"/>
-            <a:ext cx="114300" cy="132588"/>
+          </p:cNvPr>
+          <p:cNvSpPr txBox="1"/>
+          <p:nvPr/>
+        </p:nvSpPr>
+        <p:spPr>
+          <a:xfrm>
+            <a:off x="7902319" y="2982563"/>
+            <a:ext cx="357790" cy="523220"/>
           </a:xfrm>
           <a:prstGeom prst="rect">
             <a:avLst/>
           </a:prstGeom>
-        </p:spPr>
-      </p:pic>
+          <a:noFill/>
+        </p:spPr>
+        <p:txBody>
+          <a:bodyPr wrap="none" rtlCol="0">
+            <a:spAutoFit/>
+          </a:bodyPr>
+          <a:lstStyle/>
+          <a:p>
+            <a:r>
+              <a:rPr lang="en-US" sz="2800" dirty="0">
+                <a:latin typeface="cmss12" panose="020B0500000000000000" pitchFamily="34" charset="0"/>
+              </a:rPr>
+              <a:t>∗</a:t>
+            </a:r>
+            <a:endParaRPr lang="en" sz="2800" dirty="0">
+              <a:latin typeface="cmss12" panose="020B0500000000000000" pitchFamily="34" charset="0"/>
+            </a:endParaRPr>
+          </a:p>
+        </p:txBody>
+      </p:sp>
       <p:sp>
         <p:nvSpPr>
           <p:cNvPr id="102" name="Right Arrow 101"/>
@@ -13872,8 +13951,8 @@
           </p:txBody>
         </p:sp>
       </p:grpSp>
-      <mc:AlternateContent xmlns:mc="http://schemas.openxmlformats.org/markup-compatibility/2006">
-        <mc:Choice xmlns:a14="http://schemas.microsoft.com/office/drawing/2010/main" Requires="a14">
+      <mc:AlternateContent xmlns:mc="http://schemas.openxmlformats.org/markup-compatibility/2006" xmlns:a14="http://schemas.microsoft.com/office/drawing/2010/main">
+        <mc:Choice Requires="a14">
           <p:sp>
             <p:nvSpPr>
               <p:cNvPr id="88" name="TextBox 87"/>
@@ -13980,7 +14059,7 @@
             </p:txBody>
           </p:sp>
         </mc:Choice>
-        <mc:Fallback>
+        <mc:Fallback xmlns="">
           <p:sp>
             <p:nvSpPr>
               <p:cNvPr id="88" name="TextBox 87"/>
@@ -14019,8 +14098,8 @@
           </p:sp>
         </mc:Fallback>
       </mc:AlternateContent>
-      <mc:AlternateContent xmlns:mc="http://schemas.openxmlformats.org/markup-compatibility/2006">
-        <mc:Choice xmlns:a14="http://schemas.microsoft.com/office/drawing/2010/main" Requires="a14">
+      <mc:AlternateContent xmlns:mc="http://schemas.openxmlformats.org/markup-compatibility/2006" xmlns:a14="http://schemas.microsoft.com/office/drawing/2010/main">
+        <mc:Choice Requires="a14">
           <p:sp>
             <p:nvSpPr>
               <p:cNvPr id="89" name="TextBox 88"/>
@@ -14116,7 +14195,7 @@
             </p:txBody>
           </p:sp>
         </mc:Choice>
-        <mc:Fallback>
+        <mc:Fallback xmlns="">
           <p:sp>
             <p:nvSpPr>
               <p:cNvPr id="89" name="TextBox 88"/>
@@ -14155,8 +14234,8 @@
           </p:sp>
         </mc:Fallback>
       </mc:AlternateContent>
-      <mc:AlternateContent xmlns:mc="http://schemas.openxmlformats.org/markup-compatibility/2006">
-        <mc:Choice xmlns:a14="http://schemas.microsoft.com/office/drawing/2010/main" Requires="a14">
+      <mc:AlternateContent xmlns:mc="http://schemas.openxmlformats.org/markup-compatibility/2006" xmlns:a14="http://schemas.microsoft.com/office/drawing/2010/main">
+        <mc:Choice Requires="a14">
           <p:sp>
             <p:nvSpPr>
               <p:cNvPr id="90" name="TextBox 89"/>
@@ -14259,7 +14338,7 @@
             </p:txBody>
           </p:sp>
         </mc:Choice>
-        <mc:Fallback>
+        <mc:Fallback xmlns="">
           <p:sp>
             <p:nvSpPr>
               <p:cNvPr id="90" name="TextBox 89"/>
@@ -19448,8 +19527,8 @@
           </a:p>
         </p:txBody>
       </p:sp>
-      <mc:AlternateContent xmlns:mc="http://schemas.openxmlformats.org/markup-compatibility/2006">
-        <mc:Choice xmlns:a14="http://schemas.microsoft.com/office/drawing/2010/main" Requires="a14">
+      <mc:AlternateContent xmlns:mc="http://schemas.openxmlformats.org/markup-compatibility/2006" xmlns:a14="http://schemas.microsoft.com/office/drawing/2010/main">
+        <mc:Choice Requires="a14">
           <p:sp>
             <p:nvSpPr>
               <p:cNvPr id="46" name="TextBox 45"/>
@@ -19556,7 +19635,7 @@
             </p:txBody>
           </p:sp>
         </mc:Choice>
-        <mc:Fallback>
+        <mc:Fallback xmlns="">
           <p:sp>
             <p:nvSpPr>
               <p:cNvPr id="46" name="TextBox 45"/>
@@ -19595,8 +19674,8 @@
           </p:sp>
         </mc:Fallback>
       </mc:AlternateContent>
-      <mc:AlternateContent xmlns:mc="http://schemas.openxmlformats.org/markup-compatibility/2006">
-        <mc:Choice xmlns:a14="http://schemas.microsoft.com/office/drawing/2010/main" Requires="a14">
+      <mc:AlternateContent xmlns:mc="http://schemas.openxmlformats.org/markup-compatibility/2006" xmlns:a14="http://schemas.microsoft.com/office/drawing/2010/main">
+        <mc:Choice Requires="a14">
           <p:sp>
             <p:nvSpPr>
               <p:cNvPr id="48" name="TextBox 47"/>
@@ -19692,7 +19771,7 @@
             </p:txBody>
           </p:sp>
         </mc:Choice>
-        <mc:Fallback>
+        <mc:Fallback xmlns="">
           <p:sp>
             <p:nvSpPr>
               <p:cNvPr id="48" name="TextBox 47"/>
@@ -19808,8 +19887,8 @@
           </a:p>
         </p:txBody>
       </p:sp>
-      <mc:AlternateContent xmlns:mc="http://schemas.openxmlformats.org/markup-compatibility/2006">
-        <mc:Choice xmlns:a14="http://schemas.microsoft.com/office/drawing/2010/main" Requires="a14">
+      <mc:AlternateContent xmlns:mc="http://schemas.openxmlformats.org/markup-compatibility/2006" xmlns:a14="http://schemas.microsoft.com/office/drawing/2010/main">
+        <mc:Choice Requires="a14">
           <p:sp>
             <p:nvSpPr>
               <p:cNvPr id="95" name="TextBox 94"/>
@@ -19912,7 +19991,7 @@
             </p:txBody>
           </p:sp>
         </mc:Choice>
-        <mc:Fallback>
+        <mc:Fallback xmlns="">
           <p:sp>
             <p:nvSpPr>
               <p:cNvPr id="95" name="TextBox 94"/>
@@ -21859,8 +21938,8 @@
           </a:p>
         </p:txBody>
       </p:sp>
-      <mc:AlternateContent xmlns:mc="http://schemas.openxmlformats.org/markup-compatibility/2006">
-        <mc:Choice xmlns:a14="http://schemas.microsoft.com/office/drawing/2010/main" Requires="a14">
+      <mc:AlternateContent xmlns:mc="http://schemas.openxmlformats.org/markup-compatibility/2006" xmlns:a14="http://schemas.microsoft.com/office/drawing/2010/main">
+        <mc:Choice Requires="a14">
           <p:sp>
             <p:nvSpPr>
               <p:cNvPr id="46" name="TextBox 45"/>
@@ -21967,7 +22046,7 @@
             </p:txBody>
           </p:sp>
         </mc:Choice>
-        <mc:Fallback>
+        <mc:Fallback xmlns="">
           <p:sp>
             <p:nvSpPr>
               <p:cNvPr id="46" name="TextBox 45"/>
@@ -22006,8 +22085,8 @@
           </p:sp>
         </mc:Fallback>
       </mc:AlternateContent>
-      <mc:AlternateContent xmlns:mc="http://schemas.openxmlformats.org/markup-compatibility/2006">
-        <mc:Choice xmlns:a14="http://schemas.microsoft.com/office/drawing/2010/main" Requires="a14">
+      <mc:AlternateContent xmlns:mc="http://schemas.openxmlformats.org/markup-compatibility/2006" xmlns:a14="http://schemas.microsoft.com/office/drawing/2010/main">
+        <mc:Choice Requires="a14">
           <p:sp>
             <p:nvSpPr>
               <p:cNvPr id="47" name="TextBox 46"/>
@@ -22110,7 +22189,7 @@
             </p:txBody>
           </p:sp>
         </mc:Choice>
-        <mc:Fallback>
+        <mc:Fallback xmlns="">
           <p:sp>
             <p:nvSpPr>
               <p:cNvPr id="47" name="TextBox 46"/>
@@ -22643,8 +22722,8 @@
           </a:p>
         </p:txBody>
       </p:sp>
-      <mc:AlternateContent xmlns:mc="http://schemas.openxmlformats.org/markup-compatibility/2006">
-        <mc:Choice xmlns:a14="http://schemas.microsoft.com/office/drawing/2010/main" Requires="a14">
+      <mc:AlternateContent xmlns:mc="http://schemas.openxmlformats.org/markup-compatibility/2006" xmlns:a14="http://schemas.microsoft.com/office/drawing/2010/main">
+        <mc:Choice Requires="a14">
           <p:sp>
             <p:nvSpPr>
               <p:cNvPr id="92" name="TextBox 91"/>
@@ -22751,7 +22830,7 @@
             </p:txBody>
           </p:sp>
         </mc:Choice>
-        <mc:Fallback>
+        <mc:Fallback xmlns="">
           <p:sp>
             <p:nvSpPr>
               <p:cNvPr id="92" name="TextBox 91"/>
@@ -22790,8 +22869,8 @@
           </p:sp>
         </mc:Fallback>
       </mc:AlternateContent>
-      <mc:AlternateContent xmlns:mc="http://schemas.openxmlformats.org/markup-compatibility/2006">
-        <mc:Choice xmlns:a14="http://schemas.microsoft.com/office/drawing/2010/main" Requires="a14">
+      <mc:AlternateContent xmlns:mc="http://schemas.openxmlformats.org/markup-compatibility/2006" xmlns:a14="http://schemas.microsoft.com/office/drawing/2010/main">
+        <mc:Choice Requires="a14">
           <p:sp>
             <p:nvSpPr>
               <p:cNvPr id="48" name="TextBox 47"/>
@@ -22887,7 +22966,7 @@
             </p:txBody>
           </p:sp>
         </mc:Choice>
-        <mc:Fallback>
+        <mc:Fallback xmlns="">
           <p:sp>
             <p:nvSpPr>
               <p:cNvPr id="48" name="TextBox 47"/>
@@ -23358,8 +23437,8 @@
           </a:fontRef>
         </p:style>
       </p:cxnSp>
-      <mc:AlternateContent xmlns:mc="http://schemas.openxmlformats.org/markup-compatibility/2006">
-        <mc:Choice xmlns:a14="http://schemas.microsoft.com/office/drawing/2010/main" Requires="a14">
+      <mc:AlternateContent xmlns:mc="http://schemas.openxmlformats.org/markup-compatibility/2006" xmlns:a14="http://schemas.microsoft.com/office/drawing/2010/main">
+        <mc:Choice Requires="a14">
           <p:sp>
             <p:nvSpPr>
               <p:cNvPr id="131" name="TextBox 130"/>
@@ -23462,7 +23541,7 @@
             </p:txBody>
           </p:sp>
         </mc:Choice>
-        <mc:Fallback>
+        <mc:Fallback xmlns="">
           <p:sp>
             <p:nvSpPr>
               <p:cNvPr id="131" name="TextBox 130"/>
@@ -26187,13 +26266,6 @@
     <a:masterClrMapping/>
   </p:clrMapOvr>
 </p:sld>
-</file>
-
-<file path=ppt/tags/tag1.xml><?xml version="1.0" encoding="utf-8"?>
-<p:tagLst xmlns:a="http://schemas.openxmlformats.org/drawingml/2006/main" xmlns:r="http://schemas.openxmlformats.org/officeDocument/2006/relationships" xmlns:p="http://schemas.openxmlformats.org/presentationml/2006/main">
-  <p:tag name="LATEXADDIN" val="\documentclass{article}&#10;\usepackage{amsmath,color}&#10;\pagestyle{empty}&#10;\begin{document}&#10;&#10;\definecolor{mc}{rgb}{0.0, 0.0, 0.0}&#10;&#10;\[&#10;\textcolor{mc}{*}&#10;\]&#10;\end{document}"/>
-  <p:tag name="IGUANATEXSIZE" val="24"/>
-</p:tagLst>
 </file>
 
 <file path=ppt/theme/theme1.xml><?xml version="1.0" encoding="utf-8"?>

</xml_diff>